<commit_message>
Collection add and oop update
</commit_message>
<xml_diff>
--- a/OOPPart2.pptx
+++ b/OOPPart2.pptx
@@ -63,15 +63,41 @@
     <p:sldId id="324" r:id="rId58"/>
     <p:sldId id="323" r:id="rId59"/>
     <p:sldId id="314" r:id="rId60"/>
-    <p:sldId id="315" r:id="rId61"/>
-    <p:sldId id="316" r:id="rId62"/>
-    <p:sldId id="317" r:id="rId63"/>
-    <p:sldId id="318" r:id="rId64"/>
-    <p:sldId id="319" r:id="rId65"/>
-    <p:sldId id="320" r:id="rId66"/>
-    <p:sldId id="321" r:id="rId67"/>
-    <p:sldId id="322" r:id="rId68"/>
-    <p:sldId id="273" r:id="rId69"/>
+    <p:sldId id="389" r:id="rId61"/>
+    <p:sldId id="396" r:id="rId62"/>
+    <p:sldId id="315" r:id="rId63"/>
+    <p:sldId id="371" r:id="rId64"/>
+    <p:sldId id="429" r:id="rId65"/>
+    <p:sldId id="316" r:id="rId66"/>
+    <p:sldId id="317" r:id="rId67"/>
+    <p:sldId id="318" r:id="rId68"/>
+    <p:sldId id="319" r:id="rId69"/>
+    <p:sldId id="320" r:id="rId70"/>
+    <p:sldId id="321" r:id="rId71"/>
+    <p:sldId id="322" r:id="rId72"/>
+    <p:sldId id="372" r:id="rId73"/>
+    <p:sldId id="374" r:id="rId74"/>
+    <p:sldId id="375" r:id="rId75"/>
+    <p:sldId id="376" r:id="rId76"/>
+    <p:sldId id="377" r:id="rId77"/>
+    <p:sldId id="378" r:id="rId78"/>
+    <p:sldId id="379" r:id="rId79"/>
+    <p:sldId id="380" r:id="rId80"/>
+    <p:sldId id="381" r:id="rId81"/>
+    <p:sldId id="386" r:id="rId82"/>
+    <p:sldId id="382" r:id="rId83"/>
+    <p:sldId id="383" r:id="rId84"/>
+    <p:sldId id="384" r:id="rId85"/>
+    <p:sldId id="387" r:id="rId86"/>
+    <p:sldId id="388" r:id="rId87"/>
+    <p:sldId id="385" r:id="rId88"/>
+    <p:sldId id="390" r:id="rId89"/>
+    <p:sldId id="392" r:id="rId90"/>
+    <p:sldId id="393" r:id="rId91"/>
+    <p:sldId id="391" r:id="rId92"/>
+    <p:sldId id="394" r:id="rId93"/>
+    <p:sldId id="395" r:id="rId94"/>
+    <p:sldId id="273" r:id="rId95"/>
   </p:sldIdLst>
   <p:sldSz cx="12192000" cy="6858000"/>
   <p:notesSz cx="6858000" cy="9144000"/>
@@ -28278,7 +28304,7 @@
         <p:spPr/>
         <p:txBody>
           <a:bodyPr>
-            <a:normAutofit fontScale="92500"/>
+            <a:normAutofit fontScale="92500" lnSpcReduction="10000"/>
           </a:bodyPr>
           <a:lstStyle/>
           <a:p>
@@ -28441,7 +28467,7 @@
                 <a:ea typeface="SimSun" panose="02010600030101010101" pitchFamily="2" charset="-122"/>
                 <a:cs typeface="Times New Roman" panose="02020603050405020304" pitchFamily="18" charset="0"/>
               </a:rPr>
-              <a:t> sınıf olmak zorundadır</a:t>
+              <a:t> sınıf olmak zorundadır(enum class, interface class hariç)</a:t>
             </a:r>
             <a:endParaRPr lang="tr-TR" dirty="0">
               <a:latin typeface="Segoe UI" panose="020B0502040204020203" pitchFamily="34" charset="0"/>
@@ -28467,7 +28493,7 @@
         <p:spPr/>
         <p:txBody>
           <a:bodyPr>
-            <a:normAutofit fontScale="92500"/>
+            <a:normAutofit fontScale="92500" lnSpcReduction="10000"/>
           </a:bodyPr>
           <a:lstStyle/>
           <a:p>
@@ -28537,6 +28563,22 @@
                 <a:cs typeface="Times New Roman" panose="02020603050405020304" pitchFamily="18" charset="0"/>
               </a:rPr>
               <a:t> kelimesi ile yapılır.</a:t>
+            </a:r>
+            <a:endParaRPr lang="tr-TR" dirty="0">
+              <a:latin typeface="Segoe UI" panose="020B0502040204020203" pitchFamily="34" charset="0"/>
+              <a:ea typeface="SimSun" panose="02010600030101010101" pitchFamily="2" charset="-122"/>
+              <a:cs typeface="Times New Roman" panose="02020603050405020304" pitchFamily="18" charset="0"/>
+            </a:endParaRPr>
+          </a:p>
+          <a:p>
+            <a:r>
+              <a:rPr lang="tr-TR" dirty="0">
+                <a:effectLst/>
+                <a:latin typeface="Calibri" panose="020F0502020204030204" charset="0"/>
+                <a:ea typeface="SimSun" panose="02010600030101010101" pitchFamily="2" charset="-122"/>
+                <a:cs typeface="Times New Roman" panose="02020603050405020304" pitchFamily="18" charset="0"/>
+              </a:rPr>
+              <a:t>Abstract class, is-a ilişkilerinde kullanılır. Örnek : “ Volkswagen” is-a Car” = Volkswagen bir arabadır ve arabanın sahip olduğu tüm özelliklerini taşır.</a:t>
             </a:r>
             <a:endParaRPr lang="tr-TR" dirty="0">
               <a:effectLst/>
@@ -29354,6 +29396,30 @@
           </a:prstGeom>
         </p:spPr>
       </p:pic>
+      <p:pic>
+        <p:nvPicPr>
+          <p:cNvPr id="2" name="Picture 1"/>
+          <p:cNvPicPr>
+            <a:picLocks noChangeAspect="1"/>
+          </p:cNvPicPr>
+          <p:nvPr/>
+        </p:nvPicPr>
+        <p:blipFill>
+          <a:blip r:embed="rId2"/>
+          <a:stretch>
+            <a:fillRect/>
+          </a:stretch>
+        </p:blipFill>
+        <p:spPr>
+          <a:xfrm>
+            <a:off x="928370" y="623570"/>
+            <a:ext cx="10334625" cy="5610225"/>
+          </a:xfrm>
+          <a:prstGeom prst="rect">
+            <a:avLst/>
+          </a:prstGeom>
+        </p:spPr>
+      </p:pic>
     </p:spTree>
   </p:cSld>
   <p:clrMapOvr>
@@ -29444,12 +29510,43 @@
             <p:ph idx="1"/>
           </p:nvPr>
         </p:nvSpPr>
-        <p:spPr/>
+        <p:spPr>
+          <a:xfrm>
+            <a:off x="1141095" y="1626235"/>
+            <a:ext cx="9906000" cy="4164965"/>
+          </a:xfrm>
+        </p:spPr>
         <p:txBody>
           <a:bodyPr>
             <a:normAutofit fontScale="70000" lnSpcReduction="20000"/>
           </a:bodyPr>
           <a:lstStyle/>
+          <a:p>
+            <a:pPr rtl="0" fontAlgn="base">
+              <a:spcBef>
+                <a:spcPts val="0"/>
+              </a:spcBef>
+              <a:spcAft>
+                <a:spcPts val="0"/>
+              </a:spcAft>
+              <a:buFont typeface="Arial" panose="020B0604020202020204" pitchFamily="34" charset="0"/>
+              <a:buChar char="•"/>
+            </a:pPr>
+            <a:r>
+              <a:rPr lang="tr-TR" dirty="0">
+                <a:latin typeface="Segoe UI" panose="020B0502040204020203" pitchFamily="34" charset="0"/>
+                <a:ea typeface="SimSun" panose="02010600030101010101" pitchFamily="2" charset="-122"/>
+                <a:cs typeface="Times New Roman" panose="02020603050405020304" pitchFamily="18" charset="0"/>
+                <a:sym typeface="+mn-ea"/>
+              </a:rPr>
+              <a:t>Nesne yönelimli programlamadaki karşılığı metot ve property listesidir.</a:t>
+            </a:r>
+            <a:endParaRPr lang="tr-TR" dirty="0">
+              <a:latin typeface="Segoe UI" panose="020B0502040204020203" pitchFamily="34" charset="0"/>
+              <a:ea typeface="SimSun" panose="02010600030101010101" pitchFamily="2" charset="-122"/>
+              <a:cs typeface="Times New Roman" panose="02020603050405020304" pitchFamily="18" charset="0"/>
+            </a:endParaRPr>
+          </a:p>
           <a:p>
             <a:pPr rtl="0" fontAlgn="base">
               <a:spcBef>
@@ -30353,6 +30450,33 @@
                 <a:cs typeface="Times New Roman" panose="02020603050405020304" pitchFamily="18" charset="0"/>
               </a:rPr>
               <a:t> tanımlanan değişkenler, onu çağıran sınıflar tarafından değiştirilemez.</a:t>
+            </a:r>
+            <a:endParaRPr lang="tr-TR" sz="1700" dirty="0">
+              <a:latin typeface="Segoe UI" panose="020B0502040204020203" pitchFamily="34" charset="0"/>
+              <a:ea typeface="SimSun" panose="02010600030101010101" pitchFamily="2" charset="-122"/>
+              <a:cs typeface="Times New Roman" panose="02020603050405020304" pitchFamily="18" charset="0"/>
+            </a:endParaRPr>
+          </a:p>
+          <a:p>
+            <a:pPr eaLnBrk="0" fontAlgn="base" hangingPunct="0">
+              <a:lnSpc>
+                <a:spcPct val="100000"/>
+              </a:lnSpc>
+              <a:spcBef>
+                <a:spcPct val="0"/>
+              </a:spcBef>
+              <a:spcAft>
+                <a:spcPct val="0"/>
+              </a:spcAft>
+              <a:buSzTx/>
+            </a:pPr>
+            <a:r>
+              <a:rPr lang="tr-TR" sz="1700" dirty="0">
+                <a:latin typeface="Segoe UI" panose="020B0502040204020203" pitchFamily="34" charset="0"/>
+                <a:ea typeface="SimSun" panose="02010600030101010101" pitchFamily="2" charset="-122"/>
+                <a:cs typeface="Times New Roman" panose="02020603050405020304" pitchFamily="18" charset="0"/>
+              </a:rPr>
+              <a:t>Interfaceler genelde “can-do” ilişkisine göre çalışır.</a:t>
             </a:r>
             <a:endParaRPr lang="tr-TR" sz="1700" dirty="0">
               <a:latin typeface="Segoe UI" panose="020B0502040204020203" pitchFamily="34" charset="0"/>
@@ -30627,17 +30751,10 @@
         <p:cNvGrpSpPr/>
         <p:nvPr/>
       </p:nvGrpSpPr>
-      <p:grpSpPr>
-        <a:xfrm>
-          <a:off x="0" y="0"/>
-          <a:ext cx="0" cy="0"/>
-          <a:chOff x="0" y="0"/>
-          <a:chExt cx="0" cy="0"/>
-        </a:xfrm>
-      </p:grpSpPr>
+      <p:grpSpPr/>
       <p:sp>
         <p:nvSpPr>
-          <p:cNvPr id="2" name="Başlık 1"/>
+          <p:cNvPr id="2" name="Title 1"/>
           <p:cNvSpPr>
             <a:spLocks noGrp="1"/>
           </p:cNvSpPr>
@@ -30648,392 +30765,37 @@
         <p:spPr/>
         <p:txBody>
           <a:bodyPr/>
-          <a:lstStyle/>
-          <a:p>
-            <a:pPr rtl="0">
-              <a:spcBef>
-                <a:spcPts val="0"/>
-              </a:spcBef>
-              <a:spcAft>
-                <a:spcPts val="0"/>
-              </a:spcAft>
-            </a:pPr>
-            <a:r>
-              <a:rPr lang="tr-TR" sz="3200" dirty="0" err="1">
-                <a:latin typeface="Segoe UI" panose="020B0502040204020203" pitchFamily="34" charset="0"/>
-                <a:ea typeface="SimSun" panose="02010600030101010101" pitchFamily="2" charset="-122"/>
-                <a:cs typeface="Times New Roman" panose="02020603050405020304" pitchFamily="18" charset="0"/>
-              </a:rPr>
-              <a:t>Arayüz</a:t>
-            </a:r>
-            <a:r>
-              <a:rPr lang="tr-TR" sz="3200" dirty="0">
-                <a:latin typeface="Segoe UI" panose="020B0502040204020203" pitchFamily="34" charset="0"/>
-                <a:ea typeface="SimSun" panose="02010600030101010101" pitchFamily="2" charset="-122"/>
-                <a:cs typeface="Times New Roman" panose="02020603050405020304" pitchFamily="18" charset="0"/>
-              </a:rPr>
-              <a:t> (</a:t>
-            </a:r>
-            <a:r>
-              <a:rPr lang="tr-TR" sz="3200" dirty="0" err="1">
-                <a:latin typeface="Segoe UI" panose="020B0502040204020203" pitchFamily="34" charset="0"/>
-                <a:ea typeface="SimSun" panose="02010600030101010101" pitchFamily="2" charset="-122"/>
-                <a:cs typeface="Times New Roman" panose="02020603050405020304" pitchFamily="18" charset="0"/>
-              </a:rPr>
-              <a:t>Interface</a:t>
-            </a:r>
-            <a:r>
-              <a:rPr lang="tr-TR" sz="3200" dirty="0">
-                <a:latin typeface="Segoe UI" panose="020B0502040204020203" pitchFamily="34" charset="0"/>
-                <a:ea typeface="SimSun" panose="02010600030101010101" pitchFamily="2" charset="-122"/>
-                <a:cs typeface="Times New Roman" panose="02020603050405020304" pitchFamily="18" charset="0"/>
-              </a:rPr>
-              <a:t>) varken Soyut sınıflara (</a:t>
-            </a:r>
-            <a:r>
-              <a:rPr lang="tr-TR" sz="3200" dirty="0" err="1">
-                <a:latin typeface="Segoe UI" panose="020B0502040204020203" pitchFamily="34" charset="0"/>
-                <a:ea typeface="SimSun" panose="02010600030101010101" pitchFamily="2" charset="-122"/>
-                <a:cs typeface="Times New Roman" panose="02020603050405020304" pitchFamily="18" charset="0"/>
-              </a:rPr>
-              <a:t>Abstract</a:t>
-            </a:r>
-            <a:r>
-              <a:rPr lang="tr-TR" sz="3200" dirty="0">
-                <a:latin typeface="Segoe UI" panose="020B0502040204020203" pitchFamily="34" charset="0"/>
-                <a:ea typeface="SimSun" panose="02010600030101010101" pitchFamily="2" charset="-122"/>
-                <a:cs typeface="Times New Roman" panose="02020603050405020304" pitchFamily="18" charset="0"/>
-              </a:rPr>
-              <a:t> Class) neden gerek var?</a:t>
-            </a:r>
-            <a:endParaRPr lang="tr-TR" sz="3200" dirty="0">
-              <a:latin typeface="Segoe UI" panose="020B0502040204020203" pitchFamily="34" charset="0"/>
-              <a:ea typeface="SimSun" panose="02010600030101010101" pitchFamily="2" charset="-122"/>
-              <a:cs typeface="Times New Roman" panose="02020603050405020304" pitchFamily="18" charset="0"/>
-            </a:endParaRPr>
+          <a:p>
+            <a:endParaRPr lang="en-US"/>
           </a:p>
         </p:txBody>
       </p:sp>
-      <p:sp>
-        <p:nvSpPr>
-          <p:cNvPr id="3" name="İçerik Yer Tutucusu 2"/>
-          <p:cNvSpPr>
-            <a:spLocks noGrp="1"/>
-          </p:cNvSpPr>
+      <p:pic>
+        <p:nvPicPr>
+          <p:cNvPr id="4" name="Content Placeholder 3"/>
+          <p:cNvPicPr>
+            <a:picLocks noChangeAspect="1"/>
+          </p:cNvPicPr>
           <p:nvPr>
             <p:ph idx="1"/>
           </p:nvPr>
-        </p:nvSpPr>
-        <p:spPr/>
-        <p:txBody>
-          <a:bodyPr>
-            <a:normAutofit/>
-          </a:bodyPr>
-          <a:lstStyle/>
-          <a:p>
-            <a:pPr rtl="0" fontAlgn="base">
-              <a:spcBef>
-                <a:spcPts val="0"/>
-              </a:spcBef>
-              <a:spcAft>
-                <a:spcPts val="0"/>
-              </a:spcAft>
-              <a:buFont typeface="Arial" panose="020B0604020202020204" pitchFamily="34" charset="0"/>
-              <a:buChar char="•"/>
-            </a:pPr>
-            <a:r>
-              <a:rPr lang="tr-TR" sz="1700" dirty="0">
-                <a:latin typeface="Segoe UI" panose="020B0502040204020203" pitchFamily="34" charset="0"/>
-                <a:ea typeface="SimSun" panose="02010600030101010101" pitchFamily="2" charset="-122"/>
-                <a:cs typeface="Times New Roman" panose="02020603050405020304" pitchFamily="18" charset="0"/>
-              </a:rPr>
-              <a:t>Soyut sınıflar kalıtım oluşturmak için kullanılmalıdır. Kalıtım alt sınıfın (</a:t>
-            </a:r>
-            <a:r>
-              <a:rPr lang="tr-TR" sz="1700" dirty="0" err="1">
-                <a:latin typeface="Segoe UI" panose="020B0502040204020203" pitchFamily="34" charset="0"/>
-                <a:ea typeface="SimSun" panose="02010600030101010101" pitchFamily="2" charset="-122"/>
-                <a:cs typeface="Times New Roman" panose="02020603050405020304" pitchFamily="18" charset="0"/>
-              </a:rPr>
-              <a:t>subclass</a:t>
-            </a:r>
-            <a:r>
-              <a:rPr lang="tr-TR" sz="1700" dirty="0">
-                <a:latin typeface="Segoe UI" panose="020B0502040204020203" pitchFamily="34" charset="0"/>
-                <a:ea typeface="SimSun" panose="02010600030101010101" pitchFamily="2" charset="-122"/>
-                <a:cs typeface="Times New Roman" panose="02020603050405020304" pitchFamily="18" charset="0"/>
-              </a:rPr>
-              <a:t>) üst sınıfı (</a:t>
-            </a:r>
-            <a:r>
-              <a:rPr lang="tr-TR" sz="1700" dirty="0" err="1">
-                <a:latin typeface="Segoe UI" panose="020B0502040204020203" pitchFamily="34" charset="0"/>
-                <a:ea typeface="SimSun" panose="02010600030101010101" pitchFamily="2" charset="-122"/>
-                <a:cs typeface="Times New Roman" panose="02020603050405020304" pitchFamily="18" charset="0"/>
-              </a:rPr>
-              <a:t>superclass</a:t>
-            </a:r>
-            <a:r>
-              <a:rPr lang="tr-TR" sz="1700" dirty="0">
-                <a:latin typeface="Segoe UI" panose="020B0502040204020203" pitchFamily="34" charset="0"/>
-                <a:ea typeface="SimSun" panose="02010600030101010101" pitchFamily="2" charset="-122"/>
-                <a:cs typeface="Times New Roman" panose="02020603050405020304" pitchFamily="18" charset="0"/>
-              </a:rPr>
-              <a:t>) genişletmesi ile oluşur.</a:t>
-            </a:r>
-            <a:endParaRPr lang="tr-TR" sz="1700" dirty="0">
-              <a:latin typeface="Segoe UI" panose="020B0502040204020203" pitchFamily="34" charset="0"/>
-              <a:ea typeface="SimSun" panose="02010600030101010101" pitchFamily="2" charset="-122"/>
-              <a:cs typeface="Times New Roman" panose="02020603050405020304" pitchFamily="18" charset="0"/>
-            </a:endParaRPr>
-          </a:p>
-          <a:p>
-            <a:pPr rtl="0" fontAlgn="base">
-              <a:spcBef>
-                <a:spcPts val="1000"/>
-              </a:spcBef>
-              <a:spcAft>
-                <a:spcPts val="0"/>
-              </a:spcAft>
-              <a:buFont typeface="Arial" panose="020B0604020202020204" pitchFamily="34" charset="0"/>
-              <a:buChar char="•"/>
-            </a:pPr>
-            <a:r>
-              <a:rPr lang="tr-TR" sz="1700" dirty="0">
-                <a:latin typeface="Segoe UI" panose="020B0502040204020203" pitchFamily="34" charset="0"/>
-                <a:ea typeface="SimSun" panose="02010600030101010101" pitchFamily="2" charset="-122"/>
-                <a:cs typeface="Times New Roman" panose="02020603050405020304" pitchFamily="18" charset="0"/>
-              </a:rPr>
-              <a:t>Alt sınıflar, üst sınıfların belli konularda uzmanlaşmış bir versiyonu olarak düşünülebilir.</a:t>
-            </a:r>
-            <a:endParaRPr lang="tr-TR" sz="1700" dirty="0">
-              <a:latin typeface="Segoe UI" panose="020B0502040204020203" pitchFamily="34" charset="0"/>
-              <a:ea typeface="SimSun" panose="02010600030101010101" pitchFamily="2" charset="-122"/>
-              <a:cs typeface="Times New Roman" panose="02020603050405020304" pitchFamily="18" charset="0"/>
-            </a:endParaRPr>
-          </a:p>
-          <a:p>
-            <a:pPr rtl="0" fontAlgn="base">
-              <a:spcBef>
-                <a:spcPts val="1000"/>
-              </a:spcBef>
-              <a:spcAft>
-                <a:spcPts val="0"/>
-              </a:spcAft>
-              <a:buFont typeface="Arial" panose="020B0604020202020204" pitchFamily="34" charset="0"/>
-              <a:buChar char="•"/>
-            </a:pPr>
-            <a:r>
-              <a:rPr lang="tr-TR" sz="1700" dirty="0">
-                <a:latin typeface="Segoe UI" panose="020B0502040204020203" pitchFamily="34" charset="0"/>
-                <a:ea typeface="SimSun" panose="02010600030101010101" pitchFamily="2" charset="-122"/>
-                <a:cs typeface="Times New Roman" panose="02020603050405020304" pitchFamily="18" charset="0"/>
-              </a:rPr>
-              <a:t>Daha genel (</a:t>
-            </a:r>
-            <a:r>
-              <a:rPr lang="tr-TR" sz="1700" dirty="0" err="1">
-                <a:latin typeface="Segoe UI" panose="020B0502040204020203" pitchFamily="34" charset="0"/>
-                <a:ea typeface="SimSun" panose="02010600030101010101" pitchFamily="2" charset="-122"/>
-                <a:cs typeface="Times New Roman" panose="02020603050405020304" pitchFamily="18" charset="0"/>
-              </a:rPr>
-              <a:t>base</a:t>
-            </a:r>
-            <a:r>
-              <a:rPr lang="tr-TR" sz="1700" dirty="0">
-                <a:latin typeface="Segoe UI" panose="020B0502040204020203" pitchFamily="34" charset="0"/>
-                <a:ea typeface="SimSun" panose="02010600030101010101" pitchFamily="2" charset="-122"/>
-                <a:cs typeface="Times New Roman" panose="02020603050405020304" pitchFamily="18" charset="0"/>
-              </a:rPr>
-              <a:t>, </a:t>
-            </a:r>
-            <a:r>
-              <a:rPr lang="tr-TR" sz="1700" dirty="0" err="1">
-                <a:latin typeface="Segoe UI" panose="020B0502040204020203" pitchFamily="34" charset="0"/>
-                <a:ea typeface="SimSun" panose="02010600030101010101" pitchFamily="2" charset="-122"/>
-                <a:cs typeface="Times New Roman" panose="02020603050405020304" pitchFamily="18" charset="0"/>
-              </a:rPr>
-              <a:t>core</a:t>
-            </a:r>
-            <a:r>
-              <a:rPr lang="tr-TR" sz="1700" dirty="0">
-                <a:latin typeface="Segoe UI" panose="020B0502040204020203" pitchFamily="34" charset="0"/>
-                <a:ea typeface="SimSun" panose="02010600030101010101" pitchFamily="2" charset="-122"/>
-                <a:cs typeface="Times New Roman" panose="02020603050405020304" pitchFamily="18" charset="0"/>
-              </a:rPr>
-              <a:t>) içerik </a:t>
-            </a:r>
-            <a:r>
-              <a:rPr lang="tr-TR" sz="1700" dirty="0" err="1">
-                <a:latin typeface="Segoe UI" panose="020B0502040204020203" pitchFamily="34" charset="0"/>
-                <a:ea typeface="SimSun" panose="02010600030101010101" pitchFamily="2" charset="-122"/>
-                <a:cs typeface="Times New Roman" panose="02020603050405020304" pitchFamily="18" charset="0"/>
-              </a:rPr>
-              <a:t>superclass</a:t>
-            </a:r>
-            <a:r>
-              <a:rPr lang="tr-TR" sz="1700" dirty="0">
-                <a:latin typeface="Segoe UI" panose="020B0502040204020203" pitchFamily="34" charset="0"/>
-                <a:ea typeface="SimSun" panose="02010600030101010101" pitchFamily="2" charset="-122"/>
-                <a:cs typeface="Times New Roman" panose="02020603050405020304" pitchFamily="18" charset="0"/>
-              </a:rPr>
-              <a:t> içerisinde yazılırken bununla ilgili özelleştirmeler </a:t>
-            </a:r>
-            <a:r>
-              <a:rPr lang="tr-TR" sz="1700" dirty="0" err="1">
-                <a:latin typeface="Segoe UI" panose="020B0502040204020203" pitchFamily="34" charset="0"/>
-                <a:ea typeface="SimSun" panose="02010600030101010101" pitchFamily="2" charset="-122"/>
-                <a:cs typeface="Times New Roman" panose="02020603050405020304" pitchFamily="18" charset="0"/>
-              </a:rPr>
-              <a:t>subclass</a:t>
-            </a:r>
-            <a:r>
-              <a:rPr lang="tr-TR" sz="1700" dirty="0">
-                <a:latin typeface="Segoe UI" panose="020B0502040204020203" pitchFamily="34" charset="0"/>
-                <a:ea typeface="SimSun" panose="02010600030101010101" pitchFamily="2" charset="-122"/>
-                <a:cs typeface="Times New Roman" panose="02020603050405020304" pitchFamily="18" charset="0"/>
-              </a:rPr>
-              <a:t> içerisinde yapılır.</a:t>
-            </a:r>
-            <a:endParaRPr lang="tr-TR" sz="1700" dirty="0">
-              <a:latin typeface="Segoe UI" panose="020B0502040204020203" pitchFamily="34" charset="0"/>
-              <a:ea typeface="SimSun" panose="02010600030101010101" pitchFamily="2" charset="-122"/>
-              <a:cs typeface="Times New Roman" panose="02020603050405020304" pitchFamily="18" charset="0"/>
-            </a:endParaRPr>
-          </a:p>
-          <a:p>
-            <a:pPr rtl="0" fontAlgn="base">
-              <a:spcBef>
-                <a:spcPts val="0"/>
-              </a:spcBef>
-              <a:spcAft>
-                <a:spcPts val="0"/>
-              </a:spcAft>
-              <a:buFont typeface="Arial" panose="020B0604020202020204" pitchFamily="34" charset="0"/>
-              <a:buChar char="•"/>
-            </a:pPr>
-            <a:r>
-              <a:rPr lang="tr-TR" sz="1700" dirty="0" err="1">
-                <a:latin typeface="Segoe UI" panose="020B0502040204020203" pitchFamily="34" charset="0"/>
-                <a:ea typeface="SimSun" panose="02010600030101010101" pitchFamily="2" charset="-122"/>
-                <a:cs typeface="Times New Roman" panose="02020603050405020304" pitchFamily="18" charset="0"/>
-              </a:rPr>
-              <a:t>Interface</a:t>
-            </a:r>
-            <a:r>
-              <a:rPr lang="tr-TR" sz="1700" dirty="0">
-                <a:latin typeface="Segoe UI" panose="020B0502040204020203" pitchFamily="34" charset="0"/>
-                <a:ea typeface="SimSun" panose="02010600030101010101" pitchFamily="2" charset="-122"/>
-                <a:cs typeface="Times New Roman" panose="02020603050405020304" pitchFamily="18" charset="0"/>
-              </a:rPr>
-              <a:t> bir sözleşmedir. </a:t>
-            </a:r>
-            <a:endParaRPr lang="tr-TR" sz="1700" dirty="0">
-              <a:latin typeface="Segoe UI" panose="020B0502040204020203" pitchFamily="34" charset="0"/>
-              <a:ea typeface="SimSun" panose="02010600030101010101" pitchFamily="2" charset="-122"/>
-              <a:cs typeface="Times New Roman" panose="02020603050405020304" pitchFamily="18" charset="0"/>
-            </a:endParaRPr>
-          </a:p>
-          <a:p>
-            <a:pPr rtl="0" fontAlgn="base">
-              <a:spcBef>
-                <a:spcPts val="1000"/>
-              </a:spcBef>
-              <a:spcAft>
-                <a:spcPts val="0"/>
-              </a:spcAft>
-              <a:buFont typeface="Arial" panose="020B0604020202020204" pitchFamily="34" charset="0"/>
-              <a:buChar char="•"/>
-            </a:pPr>
-            <a:r>
-              <a:rPr lang="tr-TR" sz="1700" dirty="0">
-                <a:latin typeface="Segoe UI" panose="020B0502040204020203" pitchFamily="34" charset="0"/>
-                <a:ea typeface="SimSun" panose="02010600030101010101" pitchFamily="2" charset="-122"/>
-                <a:cs typeface="Times New Roman" panose="02020603050405020304" pitchFamily="18" charset="0"/>
-              </a:rPr>
-              <a:t>“</a:t>
-            </a:r>
-            <a:r>
-              <a:rPr lang="tr-TR" sz="1700" dirty="0" err="1">
-                <a:latin typeface="Segoe UI" panose="020B0502040204020203" pitchFamily="34" charset="0"/>
-                <a:ea typeface="SimSun" panose="02010600030101010101" pitchFamily="2" charset="-122"/>
-                <a:cs typeface="Times New Roman" panose="02020603050405020304" pitchFamily="18" charset="0"/>
-              </a:rPr>
-              <a:t>Implement</a:t>
-            </a:r>
-            <a:r>
-              <a:rPr lang="tr-TR" sz="1700" dirty="0">
-                <a:latin typeface="Segoe UI" panose="020B0502040204020203" pitchFamily="34" charset="0"/>
-                <a:ea typeface="SimSun" panose="02010600030101010101" pitchFamily="2" charset="-122"/>
-                <a:cs typeface="Times New Roman" panose="02020603050405020304" pitchFamily="18" charset="0"/>
-              </a:rPr>
-              <a:t>” eden bütün </a:t>
-            </a:r>
-            <a:r>
-              <a:rPr lang="tr-TR" sz="1700" dirty="0" err="1">
-                <a:latin typeface="Segoe UI" panose="020B0502040204020203" pitchFamily="34" charset="0"/>
-                <a:ea typeface="SimSun" panose="02010600030101010101" pitchFamily="2" charset="-122"/>
-                <a:cs typeface="Times New Roman" panose="02020603050405020304" pitchFamily="18" charset="0"/>
-              </a:rPr>
-              <a:t>classların</a:t>
-            </a:r>
-            <a:r>
-              <a:rPr lang="tr-TR" sz="1700" dirty="0">
-                <a:latin typeface="Segoe UI" panose="020B0502040204020203" pitchFamily="34" charset="0"/>
-                <a:ea typeface="SimSun" panose="02010600030101010101" pitchFamily="2" charset="-122"/>
-                <a:cs typeface="Times New Roman" panose="02020603050405020304" pitchFamily="18" charset="0"/>
-              </a:rPr>
-              <a:t> sözleşmede bulunan şartları yerine getirdiğini belirtir.  </a:t>
-            </a:r>
-            <a:endParaRPr lang="tr-TR" sz="1700" dirty="0">
-              <a:latin typeface="Segoe UI" panose="020B0502040204020203" pitchFamily="34" charset="0"/>
-              <a:ea typeface="SimSun" panose="02010600030101010101" pitchFamily="2" charset="-122"/>
-              <a:cs typeface="Times New Roman" panose="02020603050405020304" pitchFamily="18" charset="0"/>
-            </a:endParaRPr>
-          </a:p>
-          <a:p>
-            <a:pPr rtl="0" fontAlgn="base">
-              <a:spcBef>
-                <a:spcPts val="1000"/>
-              </a:spcBef>
-              <a:spcAft>
-                <a:spcPts val="0"/>
-              </a:spcAft>
-              <a:buFont typeface="Arial" panose="020B0604020202020204" pitchFamily="34" charset="0"/>
-              <a:buChar char="•"/>
-            </a:pPr>
-            <a:r>
-              <a:rPr lang="tr-TR" sz="1700" dirty="0">
-                <a:latin typeface="Segoe UI" panose="020B0502040204020203" pitchFamily="34" charset="0"/>
-                <a:ea typeface="SimSun" panose="02010600030101010101" pitchFamily="2" charset="-122"/>
-                <a:cs typeface="Times New Roman" panose="02020603050405020304" pitchFamily="18" charset="0"/>
-              </a:rPr>
-              <a:t>Bir çok nesne için ortaklaştırılmak istenen </a:t>
-            </a:r>
-            <a:r>
-              <a:rPr lang="tr-TR" sz="1700" dirty="0" err="1">
-                <a:latin typeface="Segoe UI" panose="020B0502040204020203" pitchFamily="34" charset="0"/>
-                <a:ea typeface="SimSun" panose="02010600030101010101" pitchFamily="2" charset="-122"/>
-                <a:cs typeface="Times New Roman" panose="02020603050405020304" pitchFamily="18" charset="0"/>
-              </a:rPr>
-              <a:t>metodlar</a:t>
-            </a:r>
-            <a:r>
-              <a:rPr lang="tr-TR" sz="1700" dirty="0">
-                <a:latin typeface="Segoe UI" panose="020B0502040204020203" pitchFamily="34" charset="0"/>
-                <a:ea typeface="SimSun" panose="02010600030101010101" pitchFamily="2" charset="-122"/>
-                <a:cs typeface="Times New Roman" panose="02020603050405020304" pitchFamily="18" charset="0"/>
-              </a:rPr>
-              <a:t> ve alanların o sınıf tarafından mecburen uygulanması için kullanılır.  </a:t>
-            </a:r>
-            <a:endParaRPr lang="tr-TR" sz="1700" dirty="0">
-              <a:latin typeface="Segoe UI" panose="020B0502040204020203" pitchFamily="34" charset="0"/>
-              <a:ea typeface="SimSun" panose="02010600030101010101" pitchFamily="2" charset="-122"/>
-              <a:cs typeface="Times New Roman" panose="02020603050405020304" pitchFamily="18" charset="0"/>
-            </a:endParaRPr>
-          </a:p>
-        </p:txBody>
-      </p:sp>
+        </p:nvPicPr>
+        <p:blipFill>
+          <a:blip r:embed="rId1"/>
+          <a:stretch>
+            <a:fillRect/>
+          </a:stretch>
+        </p:blipFill>
+        <p:spPr>
+          <a:xfrm>
+            <a:off x="635635" y="496570"/>
+            <a:ext cx="11209020" cy="6033770"/>
+          </a:xfrm>
+          <a:prstGeom prst="rect">
+            <a:avLst/>
+          </a:prstGeom>
+        </p:spPr>
+      </p:pic>
     </p:spTree>
   </p:cSld>
   <p:clrMapOvr>
@@ -31175,6 +30937,679 @@
         <p:cNvGrpSpPr/>
         <p:nvPr/>
       </p:nvGrpSpPr>
+      <p:grpSpPr/>
+      <p:sp>
+        <p:nvSpPr>
+          <p:cNvPr id="2" name="Title 1"/>
+          <p:cNvSpPr>
+            <a:spLocks noGrp="1"/>
+          </p:cNvSpPr>
+          <p:nvPr>
+            <p:ph type="title"/>
+          </p:nvPr>
+        </p:nvSpPr>
+        <p:spPr/>
+        <p:txBody>
+          <a:bodyPr/>
+          <a:p>
+            <a:endParaRPr lang="en-US"/>
+          </a:p>
+        </p:txBody>
+      </p:sp>
+      <p:pic>
+        <p:nvPicPr>
+          <p:cNvPr id="4" name="Content Placeholder 3"/>
+          <p:cNvPicPr>
+            <a:picLocks noChangeAspect="1"/>
+          </p:cNvPicPr>
+          <p:nvPr>
+            <p:ph idx="1"/>
+          </p:nvPr>
+        </p:nvPicPr>
+        <p:blipFill>
+          <a:blip r:embed="rId1"/>
+          <a:stretch>
+            <a:fillRect/>
+          </a:stretch>
+        </p:blipFill>
+        <p:spPr>
+          <a:xfrm>
+            <a:off x="438150" y="213995"/>
+            <a:ext cx="11251565" cy="6239510"/>
+          </a:xfrm>
+          <a:prstGeom prst="rect">
+            <a:avLst/>
+          </a:prstGeom>
+        </p:spPr>
+      </p:pic>
+    </p:spTree>
+  </p:cSld>
+  <p:clrMapOvr>
+    <a:masterClrMapping/>
+  </p:clrMapOvr>
+</p:sld>
+</file>
+
+<file path=ppt/slides/slide61.xml><?xml version="1.0" encoding="utf-8"?>
+<p:sld xmlns:a="http://schemas.openxmlformats.org/drawingml/2006/main" xmlns:r="http://schemas.openxmlformats.org/officeDocument/2006/relationships" xmlns:p="http://schemas.openxmlformats.org/presentationml/2006/main">
+  <p:cSld>
+    <p:spTree>
+      <p:nvGrpSpPr>
+        <p:cNvPr id="1" name=""/>
+        <p:cNvGrpSpPr/>
+        <p:nvPr/>
+      </p:nvGrpSpPr>
+      <p:grpSpPr>
+        <a:xfrm>
+          <a:off x="0" y="0"/>
+          <a:ext cx="0" cy="0"/>
+          <a:chOff x="0" y="0"/>
+          <a:chExt cx="0" cy="0"/>
+        </a:xfrm>
+      </p:grpSpPr>
+      <p:sp>
+        <p:nvSpPr>
+          <p:cNvPr id="2" name="Başlık 1"/>
+          <p:cNvSpPr>
+            <a:spLocks noGrp="1"/>
+          </p:cNvSpPr>
+          <p:nvPr>
+            <p:ph type="title"/>
+          </p:nvPr>
+        </p:nvSpPr>
+        <p:spPr/>
+        <p:txBody>
+          <a:bodyPr/>
+          <a:lstStyle/>
+          <a:p>
+            <a:pPr rtl="0">
+              <a:spcBef>
+                <a:spcPts val="0"/>
+              </a:spcBef>
+              <a:spcAft>
+                <a:spcPts val="0"/>
+              </a:spcAft>
+            </a:pPr>
+            <a:r>
+              <a:rPr lang="tr-TR" sz="3200" dirty="0" err="1">
+                <a:latin typeface="Segoe UI" panose="020B0502040204020203" pitchFamily="34" charset="0"/>
+                <a:ea typeface="SimSun" panose="02010600030101010101" pitchFamily="2" charset="-122"/>
+                <a:cs typeface="Times New Roman" panose="02020603050405020304" pitchFamily="18" charset="0"/>
+              </a:rPr>
+              <a:t>Arayüz</a:t>
+            </a:r>
+            <a:r>
+              <a:rPr lang="tr-TR" sz="3200" dirty="0">
+                <a:latin typeface="Segoe UI" panose="020B0502040204020203" pitchFamily="34" charset="0"/>
+                <a:ea typeface="SimSun" panose="02010600030101010101" pitchFamily="2" charset="-122"/>
+                <a:cs typeface="Times New Roman" panose="02020603050405020304" pitchFamily="18" charset="0"/>
+              </a:rPr>
+              <a:t> (</a:t>
+            </a:r>
+            <a:r>
+              <a:rPr lang="tr-TR" sz="3200" dirty="0" err="1">
+                <a:latin typeface="Segoe UI" panose="020B0502040204020203" pitchFamily="34" charset="0"/>
+                <a:ea typeface="SimSun" panose="02010600030101010101" pitchFamily="2" charset="-122"/>
+                <a:cs typeface="Times New Roman" panose="02020603050405020304" pitchFamily="18" charset="0"/>
+              </a:rPr>
+              <a:t>Interface</a:t>
+            </a:r>
+            <a:r>
+              <a:rPr lang="tr-TR" sz="3200" dirty="0">
+                <a:latin typeface="Segoe UI" panose="020B0502040204020203" pitchFamily="34" charset="0"/>
+                <a:ea typeface="SimSun" panose="02010600030101010101" pitchFamily="2" charset="-122"/>
+                <a:cs typeface="Times New Roman" panose="02020603050405020304" pitchFamily="18" charset="0"/>
+              </a:rPr>
+              <a:t>) varken Soyut sınıflara (</a:t>
+            </a:r>
+            <a:r>
+              <a:rPr lang="tr-TR" sz="3200" dirty="0" err="1">
+                <a:latin typeface="Segoe UI" panose="020B0502040204020203" pitchFamily="34" charset="0"/>
+                <a:ea typeface="SimSun" panose="02010600030101010101" pitchFamily="2" charset="-122"/>
+                <a:cs typeface="Times New Roman" panose="02020603050405020304" pitchFamily="18" charset="0"/>
+              </a:rPr>
+              <a:t>Abstract</a:t>
+            </a:r>
+            <a:r>
+              <a:rPr lang="tr-TR" sz="3200" dirty="0">
+                <a:latin typeface="Segoe UI" panose="020B0502040204020203" pitchFamily="34" charset="0"/>
+                <a:ea typeface="SimSun" panose="02010600030101010101" pitchFamily="2" charset="-122"/>
+                <a:cs typeface="Times New Roman" panose="02020603050405020304" pitchFamily="18" charset="0"/>
+              </a:rPr>
+              <a:t> Class) neden gerek var?</a:t>
+            </a:r>
+            <a:endParaRPr lang="tr-TR" sz="3200" dirty="0">
+              <a:latin typeface="Segoe UI" panose="020B0502040204020203" pitchFamily="34" charset="0"/>
+              <a:ea typeface="SimSun" panose="02010600030101010101" pitchFamily="2" charset="-122"/>
+              <a:cs typeface="Times New Roman" panose="02020603050405020304" pitchFamily="18" charset="0"/>
+            </a:endParaRPr>
+          </a:p>
+        </p:txBody>
+      </p:sp>
+      <p:sp>
+        <p:nvSpPr>
+          <p:cNvPr id="3" name="İçerik Yer Tutucusu 2"/>
+          <p:cNvSpPr>
+            <a:spLocks noGrp="1"/>
+          </p:cNvSpPr>
+          <p:nvPr>
+            <p:ph idx="1"/>
+          </p:nvPr>
+        </p:nvSpPr>
+        <p:spPr/>
+        <p:txBody>
+          <a:bodyPr>
+            <a:normAutofit/>
+          </a:bodyPr>
+          <a:lstStyle/>
+          <a:p>
+            <a:pPr rtl="0" fontAlgn="base">
+              <a:spcBef>
+                <a:spcPts val="0"/>
+              </a:spcBef>
+              <a:spcAft>
+                <a:spcPts val="0"/>
+              </a:spcAft>
+              <a:buFont typeface="Arial" panose="020B0604020202020204" pitchFamily="34" charset="0"/>
+              <a:buChar char="•"/>
+            </a:pPr>
+            <a:r>
+              <a:rPr lang="tr-TR" sz="1700" dirty="0">
+                <a:latin typeface="Segoe UI" panose="020B0502040204020203" pitchFamily="34" charset="0"/>
+                <a:ea typeface="SimSun" panose="02010600030101010101" pitchFamily="2" charset="-122"/>
+                <a:cs typeface="Times New Roman" panose="02020603050405020304" pitchFamily="18" charset="0"/>
+              </a:rPr>
+              <a:t>Soyut sınıflar kalıtım oluşturmak için kullanılmalıdır. Kalıtım alt sınıfın (</a:t>
+            </a:r>
+            <a:r>
+              <a:rPr lang="tr-TR" sz="1700" dirty="0" err="1">
+                <a:latin typeface="Segoe UI" panose="020B0502040204020203" pitchFamily="34" charset="0"/>
+                <a:ea typeface="SimSun" panose="02010600030101010101" pitchFamily="2" charset="-122"/>
+                <a:cs typeface="Times New Roman" panose="02020603050405020304" pitchFamily="18" charset="0"/>
+              </a:rPr>
+              <a:t>subclass</a:t>
+            </a:r>
+            <a:r>
+              <a:rPr lang="tr-TR" sz="1700" dirty="0">
+                <a:latin typeface="Segoe UI" panose="020B0502040204020203" pitchFamily="34" charset="0"/>
+                <a:ea typeface="SimSun" panose="02010600030101010101" pitchFamily="2" charset="-122"/>
+                <a:cs typeface="Times New Roman" panose="02020603050405020304" pitchFamily="18" charset="0"/>
+              </a:rPr>
+              <a:t>) üst sınıfı (</a:t>
+            </a:r>
+            <a:r>
+              <a:rPr lang="tr-TR" sz="1700" dirty="0" err="1">
+                <a:latin typeface="Segoe UI" panose="020B0502040204020203" pitchFamily="34" charset="0"/>
+                <a:ea typeface="SimSun" panose="02010600030101010101" pitchFamily="2" charset="-122"/>
+                <a:cs typeface="Times New Roman" panose="02020603050405020304" pitchFamily="18" charset="0"/>
+              </a:rPr>
+              <a:t>superclass</a:t>
+            </a:r>
+            <a:r>
+              <a:rPr lang="tr-TR" sz="1700" dirty="0">
+                <a:latin typeface="Segoe UI" panose="020B0502040204020203" pitchFamily="34" charset="0"/>
+                <a:ea typeface="SimSun" panose="02010600030101010101" pitchFamily="2" charset="-122"/>
+                <a:cs typeface="Times New Roman" panose="02020603050405020304" pitchFamily="18" charset="0"/>
+              </a:rPr>
+              <a:t>) genişletmesi ile oluşur.</a:t>
+            </a:r>
+            <a:endParaRPr lang="tr-TR" sz="1700" dirty="0">
+              <a:latin typeface="Segoe UI" panose="020B0502040204020203" pitchFamily="34" charset="0"/>
+              <a:ea typeface="SimSun" panose="02010600030101010101" pitchFamily="2" charset="-122"/>
+              <a:cs typeface="Times New Roman" panose="02020603050405020304" pitchFamily="18" charset="0"/>
+            </a:endParaRPr>
+          </a:p>
+          <a:p>
+            <a:pPr rtl="0" fontAlgn="base">
+              <a:spcBef>
+                <a:spcPts val="1000"/>
+              </a:spcBef>
+              <a:spcAft>
+                <a:spcPts val="0"/>
+              </a:spcAft>
+              <a:buFont typeface="Arial" panose="020B0604020202020204" pitchFamily="34" charset="0"/>
+              <a:buChar char="•"/>
+            </a:pPr>
+            <a:r>
+              <a:rPr lang="tr-TR" sz="1700" dirty="0">
+                <a:latin typeface="Segoe UI" panose="020B0502040204020203" pitchFamily="34" charset="0"/>
+                <a:ea typeface="SimSun" panose="02010600030101010101" pitchFamily="2" charset="-122"/>
+                <a:cs typeface="Times New Roman" panose="02020603050405020304" pitchFamily="18" charset="0"/>
+              </a:rPr>
+              <a:t>Alt sınıflar, üst sınıfların belli konularda uzmanlaşmış bir versiyonu olarak düşünülebilir.</a:t>
+            </a:r>
+            <a:endParaRPr lang="tr-TR" sz="1700" dirty="0">
+              <a:latin typeface="Segoe UI" panose="020B0502040204020203" pitchFamily="34" charset="0"/>
+              <a:ea typeface="SimSun" panose="02010600030101010101" pitchFamily="2" charset="-122"/>
+              <a:cs typeface="Times New Roman" panose="02020603050405020304" pitchFamily="18" charset="0"/>
+            </a:endParaRPr>
+          </a:p>
+          <a:p>
+            <a:pPr rtl="0" fontAlgn="base">
+              <a:spcBef>
+                <a:spcPts val="1000"/>
+              </a:spcBef>
+              <a:spcAft>
+                <a:spcPts val="0"/>
+              </a:spcAft>
+              <a:buFont typeface="Arial" panose="020B0604020202020204" pitchFamily="34" charset="0"/>
+              <a:buChar char="•"/>
+            </a:pPr>
+            <a:r>
+              <a:rPr lang="tr-TR" sz="1700" dirty="0">
+                <a:latin typeface="Segoe UI" panose="020B0502040204020203" pitchFamily="34" charset="0"/>
+                <a:ea typeface="SimSun" panose="02010600030101010101" pitchFamily="2" charset="-122"/>
+                <a:cs typeface="Times New Roman" panose="02020603050405020304" pitchFamily="18" charset="0"/>
+              </a:rPr>
+              <a:t>Daha genel (</a:t>
+            </a:r>
+            <a:r>
+              <a:rPr lang="tr-TR" sz="1700" dirty="0" err="1">
+                <a:latin typeface="Segoe UI" panose="020B0502040204020203" pitchFamily="34" charset="0"/>
+                <a:ea typeface="SimSun" panose="02010600030101010101" pitchFamily="2" charset="-122"/>
+                <a:cs typeface="Times New Roman" panose="02020603050405020304" pitchFamily="18" charset="0"/>
+              </a:rPr>
+              <a:t>base</a:t>
+            </a:r>
+            <a:r>
+              <a:rPr lang="tr-TR" sz="1700" dirty="0">
+                <a:latin typeface="Segoe UI" panose="020B0502040204020203" pitchFamily="34" charset="0"/>
+                <a:ea typeface="SimSun" panose="02010600030101010101" pitchFamily="2" charset="-122"/>
+                <a:cs typeface="Times New Roman" panose="02020603050405020304" pitchFamily="18" charset="0"/>
+              </a:rPr>
+              <a:t>, </a:t>
+            </a:r>
+            <a:r>
+              <a:rPr lang="tr-TR" sz="1700" dirty="0" err="1">
+                <a:latin typeface="Segoe UI" panose="020B0502040204020203" pitchFamily="34" charset="0"/>
+                <a:ea typeface="SimSun" panose="02010600030101010101" pitchFamily="2" charset="-122"/>
+                <a:cs typeface="Times New Roman" panose="02020603050405020304" pitchFamily="18" charset="0"/>
+              </a:rPr>
+              <a:t>core</a:t>
+            </a:r>
+            <a:r>
+              <a:rPr lang="tr-TR" sz="1700" dirty="0">
+                <a:latin typeface="Segoe UI" panose="020B0502040204020203" pitchFamily="34" charset="0"/>
+                <a:ea typeface="SimSun" panose="02010600030101010101" pitchFamily="2" charset="-122"/>
+                <a:cs typeface="Times New Roman" panose="02020603050405020304" pitchFamily="18" charset="0"/>
+              </a:rPr>
+              <a:t>) içerik </a:t>
+            </a:r>
+            <a:r>
+              <a:rPr lang="tr-TR" sz="1700" dirty="0" err="1">
+                <a:latin typeface="Segoe UI" panose="020B0502040204020203" pitchFamily="34" charset="0"/>
+                <a:ea typeface="SimSun" panose="02010600030101010101" pitchFamily="2" charset="-122"/>
+                <a:cs typeface="Times New Roman" panose="02020603050405020304" pitchFamily="18" charset="0"/>
+              </a:rPr>
+              <a:t>superclass</a:t>
+            </a:r>
+            <a:r>
+              <a:rPr lang="tr-TR" sz="1700" dirty="0">
+                <a:latin typeface="Segoe UI" panose="020B0502040204020203" pitchFamily="34" charset="0"/>
+                <a:ea typeface="SimSun" panose="02010600030101010101" pitchFamily="2" charset="-122"/>
+                <a:cs typeface="Times New Roman" panose="02020603050405020304" pitchFamily="18" charset="0"/>
+              </a:rPr>
+              <a:t> içerisinde yazılırken bununla ilgili özelleştirmeler </a:t>
+            </a:r>
+            <a:r>
+              <a:rPr lang="tr-TR" sz="1700" dirty="0" err="1">
+                <a:latin typeface="Segoe UI" panose="020B0502040204020203" pitchFamily="34" charset="0"/>
+                <a:ea typeface="SimSun" panose="02010600030101010101" pitchFamily="2" charset="-122"/>
+                <a:cs typeface="Times New Roman" panose="02020603050405020304" pitchFamily="18" charset="0"/>
+              </a:rPr>
+              <a:t>subclass</a:t>
+            </a:r>
+            <a:r>
+              <a:rPr lang="tr-TR" sz="1700" dirty="0">
+                <a:latin typeface="Segoe UI" panose="020B0502040204020203" pitchFamily="34" charset="0"/>
+                <a:ea typeface="SimSun" panose="02010600030101010101" pitchFamily="2" charset="-122"/>
+                <a:cs typeface="Times New Roman" panose="02020603050405020304" pitchFamily="18" charset="0"/>
+              </a:rPr>
+              <a:t> içerisinde yapılır.</a:t>
+            </a:r>
+            <a:endParaRPr lang="tr-TR" sz="1700" dirty="0">
+              <a:latin typeface="Segoe UI" panose="020B0502040204020203" pitchFamily="34" charset="0"/>
+              <a:ea typeface="SimSun" panose="02010600030101010101" pitchFamily="2" charset="-122"/>
+              <a:cs typeface="Times New Roman" panose="02020603050405020304" pitchFamily="18" charset="0"/>
+            </a:endParaRPr>
+          </a:p>
+          <a:p>
+            <a:pPr rtl="0" fontAlgn="base">
+              <a:spcBef>
+                <a:spcPts val="0"/>
+              </a:spcBef>
+              <a:spcAft>
+                <a:spcPts val="0"/>
+              </a:spcAft>
+              <a:buFont typeface="Arial" panose="020B0604020202020204" pitchFamily="34" charset="0"/>
+              <a:buChar char="•"/>
+            </a:pPr>
+            <a:r>
+              <a:rPr lang="tr-TR" sz="1700" dirty="0" err="1">
+                <a:latin typeface="Segoe UI" panose="020B0502040204020203" pitchFamily="34" charset="0"/>
+                <a:ea typeface="SimSun" panose="02010600030101010101" pitchFamily="2" charset="-122"/>
+                <a:cs typeface="Times New Roman" panose="02020603050405020304" pitchFamily="18" charset="0"/>
+              </a:rPr>
+              <a:t>Interface</a:t>
+            </a:r>
+            <a:r>
+              <a:rPr lang="tr-TR" sz="1700" dirty="0">
+                <a:latin typeface="Segoe UI" panose="020B0502040204020203" pitchFamily="34" charset="0"/>
+                <a:ea typeface="SimSun" panose="02010600030101010101" pitchFamily="2" charset="-122"/>
+                <a:cs typeface="Times New Roman" panose="02020603050405020304" pitchFamily="18" charset="0"/>
+              </a:rPr>
+              <a:t> bir sözleşmedir. </a:t>
+            </a:r>
+            <a:endParaRPr lang="tr-TR" sz="1700" dirty="0">
+              <a:latin typeface="Segoe UI" panose="020B0502040204020203" pitchFamily="34" charset="0"/>
+              <a:ea typeface="SimSun" panose="02010600030101010101" pitchFamily="2" charset="-122"/>
+              <a:cs typeface="Times New Roman" panose="02020603050405020304" pitchFamily="18" charset="0"/>
+            </a:endParaRPr>
+          </a:p>
+          <a:p>
+            <a:pPr rtl="0" fontAlgn="base">
+              <a:spcBef>
+                <a:spcPts val="1000"/>
+              </a:spcBef>
+              <a:spcAft>
+                <a:spcPts val="0"/>
+              </a:spcAft>
+              <a:buFont typeface="Arial" panose="020B0604020202020204" pitchFamily="34" charset="0"/>
+              <a:buChar char="•"/>
+            </a:pPr>
+            <a:r>
+              <a:rPr lang="tr-TR" sz="1700" dirty="0">
+                <a:latin typeface="Segoe UI" panose="020B0502040204020203" pitchFamily="34" charset="0"/>
+                <a:ea typeface="SimSun" panose="02010600030101010101" pitchFamily="2" charset="-122"/>
+                <a:cs typeface="Times New Roman" panose="02020603050405020304" pitchFamily="18" charset="0"/>
+              </a:rPr>
+              <a:t>“</a:t>
+            </a:r>
+            <a:r>
+              <a:rPr lang="tr-TR" sz="1700" dirty="0" err="1">
+                <a:latin typeface="Segoe UI" panose="020B0502040204020203" pitchFamily="34" charset="0"/>
+                <a:ea typeface="SimSun" panose="02010600030101010101" pitchFamily="2" charset="-122"/>
+                <a:cs typeface="Times New Roman" panose="02020603050405020304" pitchFamily="18" charset="0"/>
+              </a:rPr>
+              <a:t>Implement</a:t>
+            </a:r>
+            <a:r>
+              <a:rPr lang="tr-TR" sz="1700" dirty="0">
+                <a:latin typeface="Segoe UI" panose="020B0502040204020203" pitchFamily="34" charset="0"/>
+                <a:ea typeface="SimSun" panose="02010600030101010101" pitchFamily="2" charset="-122"/>
+                <a:cs typeface="Times New Roman" panose="02020603050405020304" pitchFamily="18" charset="0"/>
+              </a:rPr>
+              <a:t>” eden bütün </a:t>
+            </a:r>
+            <a:r>
+              <a:rPr lang="tr-TR" sz="1700" dirty="0" err="1">
+                <a:latin typeface="Segoe UI" panose="020B0502040204020203" pitchFamily="34" charset="0"/>
+                <a:ea typeface="SimSun" panose="02010600030101010101" pitchFamily="2" charset="-122"/>
+                <a:cs typeface="Times New Roman" panose="02020603050405020304" pitchFamily="18" charset="0"/>
+              </a:rPr>
+              <a:t>classların</a:t>
+            </a:r>
+            <a:r>
+              <a:rPr lang="tr-TR" sz="1700" dirty="0">
+                <a:latin typeface="Segoe UI" panose="020B0502040204020203" pitchFamily="34" charset="0"/>
+                <a:ea typeface="SimSun" panose="02010600030101010101" pitchFamily="2" charset="-122"/>
+                <a:cs typeface="Times New Roman" panose="02020603050405020304" pitchFamily="18" charset="0"/>
+              </a:rPr>
+              <a:t> sözleşmede bulunan şartları yerine getirdiğini belirtir.  </a:t>
+            </a:r>
+            <a:endParaRPr lang="tr-TR" sz="1700" dirty="0">
+              <a:latin typeface="Segoe UI" panose="020B0502040204020203" pitchFamily="34" charset="0"/>
+              <a:ea typeface="SimSun" panose="02010600030101010101" pitchFamily="2" charset="-122"/>
+              <a:cs typeface="Times New Roman" panose="02020603050405020304" pitchFamily="18" charset="0"/>
+            </a:endParaRPr>
+          </a:p>
+          <a:p>
+            <a:pPr rtl="0" fontAlgn="base">
+              <a:spcBef>
+                <a:spcPts val="1000"/>
+              </a:spcBef>
+              <a:spcAft>
+                <a:spcPts val="0"/>
+              </a:spcAft>
+              <a:buFont typeface="Arial" panose="020B0604020202020204" pitchFamily="34" charset="0"/>
+              <a:buChar char="•"/>
+            </a:pPr>
+            <a:r>
+              <a:rPr lang="tr-TR" sz="1700" dirty="0">
+                <a:latin typeface="Segoe UI" panose="020B0502040204020203" pitchFamily="34" charset="0"/>
+                <a:ea typeface="SimSun" panose="02010600030101010101" pitchFamily="2" charset="-122"/>
+                <a:cs typeface="Times New Roman" panose="02020603050405020304" pitchFamily="18" charset="0"/>
+              </a:rPr>
+              <a:t>Bir çok nesne için ortaklaştırılmak istenen </a:t>
+            </a:r>
+            <a:r>
+              <a:rPr lang="tr-TR" sz="1700" dirty="0" err="1">
+                <a:latin typeface="Segoe UI" panose="020B0502040204020203" pitchFamily="34" charset="0"/>
+                <a:ea typeface="SimSun" panose="02010600030101010101" pitchFamily="2" charset="-122"/>
+                <a:cs typeface="Times New Roman" panose="02020603050405020304" pitchFamily="18" charset="0"/>
+              </a:rPr>
+              <a:t>metodlar</a:t>
+            </a:r>
+            <a:r>
+              <a:rPr lang="tr-TR" sz="1700" dirty="0">
+                <a:latin typeface="Segoe UI" panose="020B0502040204020203" pitchFamily="34" charset="0"/>
+                <a:ea typeface="SimSun" panose="02010600030101010101" pitchFamily="2" charset="-122"/>
+                <a:cs typeface="Times New Roman" panose="02020603050405020304" pitchFamily="18" charset="0"/>
+              </a:rPr>
+              <a:t> ve alanların o sınıf tarafından mecburen uygulanması için kullanılır.  </a:t>
+            </a:r>
+            <a:endParaRPr lang="tr-TR" sz="1700" dirty="0">
+              <a:latin typeface="Segoe UI" panose="020B0502040204020203" pitchFamily="34" charset="0"/>
+              <a:ea typeface="SimSun" panose="02010600030101010101" pitchFamily="2" charset="-122"/>
+              <a:cs typeface="Times New Roman" panose="02020603050405020304" pitchFamily="18" charset="0"/>
+            </a:endParaRPr>
+          </a:p>
+        </p:txBody>
+      </p:sp>
+    </p:spTree>
+  </p:cSld>
+  <p:clrMapOvr>
+    <a:masterClrMapping/>
+  </p:clrMapOvr>
+</p:sld>
+</file>
+
+<file path=ppt/slides/slide62.xml><?xml version="1.0" encoding="utf-8"?>
+<p:sld xmlns:a="http://schemas.openxmlformats.org/drawingml/2006/main" xmlns:r="http://schemas.openxmlformats.org/officeDocument/2006/relationships" xmlns:p="http://schemas.openxmlformats.org/presentationml/2006/main">
+  <p:cSld>
+    <p:spTree>
+      <p:nvGrpSpPr>
+        <p:cNvPr id="1" name=""/>
+        <p:cNvGrpSpPr/>
+        <p:nvPr/>
+      </p:nvGrpSpPr>
+      <p:grpSpPr/>
+      <p:sp>
+        <p:nvSpPr>
+          <p:cNvPr id="2" name="Title 1"/>
+          <p:cNvSpPr>
+            <a:spLocks noGrp="1"/>
+          </p:cNvSpPr>
+          <p:nvPr>
+            <p:ph type="title"/>
+          </p:nvPr>
+        </p:nvSpPr>
+        <p:spPr/>
+        <p:txBody>
+          <a:bodyPr/>
+          <a:p>
+            <a:r>
+              <a:rPr lang="tr-TR" altLang="en-US"/>
+              <a:t>Önemli Farklar</a:t>
+            </a:r>
+            <a:endParaRPr lang="tr-TR" altLang="en-US"/>
+          </a:p>
+        </p:txBody>
+      </p:sp>
+      <p:sp>
+        <p:nvSpPr>
+          <p:cNvPr id="3" name="Content Placeholder 2"/>
+          <p:cNvSpPr>
+            <a:spLocks noGrp="1"/>
+          </p:cNvSpPr>
+          <p:nvPr>
+            <p:ph idx="1"/>
+          </p:nvPr>
+        </p:nvSpPr>
+        <p:spPr>
+          <a:xfrm>
+            <a:off x="1141095" y="1626235"/>
+            <a:ext cx="9906000" cy="4164965"/>
+          </a:xfrm>
+        </p:spPr>
+        <p:txBody>
+          <a:bodyPr>
+            <a:normAutofit/>
+          </a:bodyPr>
+          <a:p>
+            <a:r>
+              <a:rPr lang="en-US"/>
+              <a:t>1-) Bir sınıf birden fazla interface’i inherit olarak alabilir ama bir sınıfa bir tane abstract class inherit alınabilir.</a:t>
+            </a:r>
+            <a:endParaRPr lang="en-US"/>
+          </a:p>
+          <a:p>
+            <a:r>
+              <a:rPr lang="tr-TR" altLang="en-US"/>
+              <a:t>2</a:t>
+            </a:r>
+            <a:r>
+              <a:rPr lang="en-US"/>
+              <a:t>-) Abstract classları kullanmak hız açısından avantaj sağlar.</a:t>
+            </a:r>
+            <a:endParaRPr lang="en-US"/>
+          </a:p>
+          <a:p>
+            <a:r>
+              <a:rPr lang="tr-TR" altLang="en-US"/>
+              <a:t>3</a:t>
+            </a:r>
+            <a:r>
+              <a:rPr lang="en-US"/>
+              <a:t>-) Interfaceler çoklu kalıtımı sağlamaya yardımcı abstract classlar ise çoklu kalıtımı desteklemez.</a:t>
+            </a:r>
+            <a:endParaRPr lang="en-US"/>
+          </a:p>
+          <a:p>
+            <a:r>
+              <a:rPr lang="tr-TR" altLang="en-US"/>
+              <a:t>4</a:t>
+            </a:r>
+            <a:r>
+              <a:rPr lang="en-US"/>
+              <a:t>-) Interface yapıcı metodlar(constructor) içermez. Abstract class yapıcı metodlar içerebilir.</a:t>
+            </a:r>
+            <a:endParaRPr lang="en-US"/>
+          </a:p>
+          <a:p>
+            <a:pPr marL="0" indent="0">
+              <a:buNone/>
+            </a:pPr>
+            <a:endParaRPr lang="en-US"/>
+          </a:p>
+        </p:txBody>
+      </p:sp>
+    </p:spTree>
+  </p:cSld>
+  <p:clrMapOvr>
+    <a:masterClrMapping/>
+  </p:clrMapOvr>
+</p:sld>
+</file>
+
+<file path=ppt/slides/slide63.xml><?xml version="1.0" encoding="utf-8"?>
+<p:sld xmlns:a="http://schemas.openxmlformats.org/drawingml/2006/main" xmlns:r="http://schemas.openxmlformats.org/officeDocument/2006/relationships" xmlns:p="http://schemas.openxmlformats.org/presentationml/2006/main">
+  <p:cSld>
+    <p:spTree>
+      <p:nvGrpSpPr>
+        <p:cNvPr id="1" name=""/>
+        <p:cNvGrpSpPr/>
+        <p:nvPr/>
+      </p:nvGrpSpPr>
+      <p:grpSpPr/>
+      <p:sp>
+        <p:nvSpPr>
+          <p:cNvPr id="2" name="Title 1"/>
+          <p:cNvSpPr>
+            <a:spLocks noGrp="1"/>
+          </p:cNvSpPr>
+          <p:nvPr>
+            <p:ph type="title"/>
+          </p:nvPr>
+        </p:nvSpPr>
+        <p:spPr/>
+        <p:txBody>
+          <a:bodyPr/>
+          <a:p>
+            <a:endParaRPr lang="en-US"/>
+          </a:p>
+        </p:txBody>
+      </p:sp>
+      <p:sp>
+        <p:nvSpPr>
+          <p:cNvPr id="3" name="Content Placeholder 2"/>
+          <p:cNvSpPr>
+            <a:spLocks noGrp="1"/>
+          </p:cNvSpPr>
+          <p:nvPr>
+            <p:ph idx="1"/>
+          </p:nvPr>
+        </p:nvSpPr>
+        <p:spPr/>
+        <p:txBody>
+          <a:bodyPr/>
+          <a:p>
+            <a:r>
+              <a:rPr lang="tr-TR" altLang="en-US"/>
+              <a:t>interface class bir diğer interface class ‘a implement edilebilir mi?</a:t>
+            </a:r>
+            <a:endParaRPr lang="tr-TR" altLang="en-US"/>
+          </a:p>
+          <a:p>
+            <a:r>
+              <a:rPr lang="tr-TR" altLang="en-US"/>
+              <a:t>abstract class bir diğer abstract class’a extend edilebilir mi?</a:t>
+            </a:r>
+            <a:endParaRPr lang="tr-TR" altLang="en-US"/>
+          </a:p>
+          <a:p>
+            <a:r>
+              <a:rPr lang="tr-TR" altLang="en-US"/>
+              <a:t>bir interface class bir abstract class’tan kalıtım alabilir mi?</a:t>
+            </a:r>
+            <a:endParaRPr lang="tr-TR" altLang="en-US"/>
+          </a:p>
+          <a:p>
+            <a:r>
+              <a:rPr lang="tr-TR" altLang="en-US"/>
+              <a:t>bir abstract class’a bir interface class implements edilebilir mi?</a:t>
+            </a:r>
+            <a:endParaRPr lang="tr-TR" altLang="en-US"/>
+          </a:p>
+        </p:txBody>
+      </p:sp>
+    </p:spTree>
+  </p:cSld>
+  <p:clrMapOvr>
+    <a:masterClrMapping/>
+  </p:clrMapOvr>
+</p:sld>
+</file>
+
+<file path=ppt/slides/slide64.xml><?xml version="1.0" encoding="utf-8"?>
+<p:sld xmlns:a="http://schemas.openxmlformats.org/drawingml/2006/main" xmlns:r="http://schemas.openxmlformats.org/officeDocument/2006/relationships" xmlns:p="http://schemas.openxmlformats.org/presentationml/2006/main">
+  <p:cSld>
+    <p:spTree>
+      <p:nvGrpSpPr>
+        <p:cNvPr id="1" name=""/>
+        <p:cNvGrpSpPr/>
+        <p:nvPr/>
+      </p:nvGrpSpPr>
       <p:grpSpPr>
         <a:xfrm>
           <a:off x="0" y="0"/>
@@ -31222,7 +31657,7 @@
 </p:sld>
 </file>
 
-<file path=ppt/slides/slide61.xml><?xml version="1.0" encoding="utf-8"?>
+<file path=ppt/slides/slide65.xml><?xml version="1.0" encoding="utf-8"?>
 <p:sld xmlns:a="http://schemas.openxmlformats.org/drawingml/2006/main" xmlns:r="http://schemas.openxmlformats.org/officeDocument/2006/relationships" xmlns:p="http://schemas.openxmlformats.org/presentationml/2006/main">
   <p:cSld>
     <p:spTree>
@@ -31892,7 +32327,7 @@
 </p:sld>
 </file>
 
-<file path=ppt/slides/slide62.xml><?xml version="1.0" encoding="utf-8"?>
+<file path=ppt/slides/slide66.xml><?xml version="1.0" encoding="utf-8"?>
 <p:sld xmlns:a="http://schemas.openxmlformats.org/drawingml/2006/main" xmlns:r="http://schemas.openxmlformats.org/officeDocument/2006/relationships" xmlns:p="http://schemas.openxmlformats.org/presentationml/2006/main">
   <p:cSld>
     <p:spTree>
@@ -31964,7 +32399,7 @@
 </p:sld>
 </file>
 
-<file path=ppt/slides/slide63.xml><?xml version="1.0" encoding="utf-8"?>
+<file path=ppt/slides/slide67.xml><?xml version="1.0" encoding="utf-8"?>
 <p:sld xmlns:a="http://schemas.openxmlformats.org/drawingml/2006/main" xmlns:r="http://schemas.openxmlformats.org/officeDocument/2006/relationships" xmlns:p="http://schemas.openxmlformats.org/presentationml/2006/main">
   <p:cSld>
     <p:spTree>
@@ -33428,7 +33863,7 @@
 </p:sld>
 </file>
 
-<file path=ppt/slides/slide64.xml><?xml version="1.0" encoding="utf-8"?>
+<file path=ppt/slides/slide68.xml><?xml version="1.0" encoding="utf-8"?>
 <p:sld xmlns:a="http://schemas.openxmlformats.org/drawingml/2006/main" xmlns:r="http://schemas.openxmlformats.org/officeDocument/2006/relationships" xmlns:p="http://schemas.openxmlformats.org/presentationml/2006/main">
   <p:cSld>
     <p:spTree>
@@ -33750,7 +34185,7 @@
 </p:sld>
 </file>
 
-<file path=ppt/slides/slide65.xml><?xml version="1.0" encoding="utf-8"?>
+<file path=ppt/slides/slide69.xml><?xml version="1.0" encoding="utf-8"?>
 <p:sld xmlns:a="http://schemas.openxmlformats.org/drawingml/2006/main" xmlns:r="http://schemas.openxmlformats.org/officeDocument/2006/relationships" xmlns:p="http://schemas.openxmlformats.org/presentationml/2006/main">
   <p:cSld>
     <p:spTree>
@@ -34420,7 +34855,155 @@
 </p:sld>
 </file>
 
-<file path=ppt/slides/slide66.xml><?xml version="1.0" encoding="utf-8"?>
+<file path=ppt/slides/slide7.xml><?xml version="1.0" encoding="utf-8"?>
+<p:sld xmlns:a="http://schemas.openxmlformats.org/drawingml/2006/main" xmlns:r="http://schemas.openxmlformats.org/officeDocument/2006/relationships" xmlns:p="http://schemas.openxmlformats.org/presentationml/2006/main">
+  <p:cSld>
+    <p:spTree>
+      <p:nvGrpSpPr>
+        <p:cNvPr id="1" name=""/>
+        <p:cNvGrpSpPr/>
+        <p:nvPr/>
+      </p:nvGrpSpPr>
+      <p:grpSpPr>
+        <a:xfrm>
+          <a:off x="0" y="0"/>
+          <a:ext cx="0" cy="0"/>
+          <a:chOff x="0" y="0"/>
+          <a:chExt cx="0" cy="0"/>
+        </a:xfrm>
+      </p:grpSpPr>
+      <p:sp>
+        <p:nvSpPr>
+          <p:cNvPr id="2" name="Başlık 1"/>
+          <p:cNvSpPr>
+            <a:spLocks noGrp="1"/>
+          </p:cNvSpPr>
+          <p:nvPr>
+            <p:ph type="title"/>
+          </p:nvPr>
+        </p:nvSpPr>
+        <p:spPr/>
+        <p:txBody>
+          <a:bodyPr/>
+          <a:lstStyle/>
+          <a:p>
+            <a:r>
+              <a:rPr lang="tr-TR" dirty="0" err="1"/>
+              <a:t>Constants</a:t>
+            </a:r>
+            <a:endParaRPr lang="tr-TR" dirty="0"/>
+          </a:p>
+        </p:txBody>
+      </p:sp>
+      <p:sp>
+        <p:nvSpPr>
+          <p:cNvPr id="3" name="İçerik Yer Tutucusu 2"/>
+          <p:cNvSpPr>
+            <a:spLocks noGrp="1"/>
+          </p:cNvSpPr>
+          <p:nvPr>
+            <p:ph idx="1"/>
+          </p:nvPr>
+        </p:nvSpPr>
+        <p:spPr/>
+        <p:txBody>
+          <a:bodyPr/>
+          <a:lstStyle/>
+          <a:p>
+            <a:r>
+              <a:rPr lang="tr-TR" dirty="0"/>
+              <a:t>final </a:t>
+            </a:r>
+            <a:r>
+              <a:rPr lang="tr-TR" dirty="0" err="1"/>
+              <a:t>keyword</a:t>
+            </a:r>
+            <a:r>
+              <a:rPr lang="tr-TR" dirty="0"/>
+              <a:t> ‘ü kullanılarak yapılır.</a:t>
+            </a:r>
+            <a:endParaRPr lang="tr-TR" dirty="0"/>
+          </a:p>
+          <a:p>
+            <a:r>
+              <a:rPr lang="tr-TR" dirty="0"/>
+              <a:t>Uygulama başladıktan sonra değiştirilemez</a:t>
+            </a:r>
+            <a:endParaRPr lang="tr-TR" dirty="0"/>
+          </a:p>
+          <a:p>
+            <a:r>
+              <a:rPr lang="tr-TR" dirty="0"/>
+              <a:t>Bildirimde veya </a:t>
+            </a:r>
+            <a:r>
+              <a:rPr lang="tr-TR" dirty="0" err="1"/>
+              <a:t>constructor’da</a:t>
+            </a:r>
+            <a:r>
+              <a:rPr lang="tr-TR" dirty="0"/>
+              <a:t> bir değer atanmalıdır</a:t>
+            </a:r>
+            <a:endParaRPr lang="tr-TR" dirty="0"/>
+          </a:p>
+          <a:p>
+            <a:r>
+              <a:rPr lang="tr-TR" dirty="0"/>
+              <a:t>Mesela : </a:t>
+            </a:r>
+            <a:r>
+              <a:rPr lang="en-US" dirty="0" err="1"/>
+              <a:t>Math.PI</a:t>
+            </a:r>
+            <a:r>
+              <a:rPr lang="en-US" dirty="0"/>
+              <a:t> </a:t>
+            </a:r>
+            <a:r>
+              <a:rPr lang="tr-TR" dirty="0"/>
+              <a:t>ve </a:t>
+            </a:r>
+            <a:r>
+              <a:rPr lang="en-US" dirty="0" err="1"/>
+              <a:t>Math.E</a:t>
+            </a:r>
+            <a:r>
+              <a:rPr lang="en-US" dirty="0"/>
+              <a:t> final static</a:t>
+            </a:r>
+            <a:r>
+              <a:rPr lang="tr-TR" dirty="0"/>
+              <a:t> </a:t>
+            </a:r>
+            <a:r>
+              <a:rPr lang="tr-TR" dirty="0" err="1"/>
+              <a:t>fields</a:t>
+            </a:r>
+            <a:r>
+              <a:rPr lang="tr-TR" dirty="0"/>
+              <a:t> ‘</a:t>
+            </a:r>
+            <a:r>
+              <a:rPr lang="tr-TR" dirty="0" err="1"/>
+              <a:t>dır</a:t>
+            </a:r>
+            <a:r>
+              <a:rPr lang="tr-TR" dirty="0"/>
+              <a:t>.</a:t>
+            </a:r>
+            <a:endParaRPr lang="tr-TR" dirty="0"/>
+          </a:p>
+        </p:txBody>
+      </p:sp>
+    </p:spTree>
+  </p:cSld>
+  <p:clrMapOvr>
+    <a:masterClrMapping/>
+  </p:clrMapOvr>
+</p:sld>
+</file>
+
+<file path=ppt/slides/slide70.xml><?xml version="1.0" encoding="utf-8"?>
 <p:sld xmlns:a="http://schemas.openxmlformats.org/drawingml/2006/main" xmlns:r="http://schemas.openxmlformats.org/officeDocument/2006/relationships" xmlns:p="http://schemas.openxmlformats.org/presentationml/2006/main">
   <p:cSld>
     <p:spTree>
@@ -35186,7 +35769,7 @@
 </p:sld>
 </file>
 
-<file path=ppt/slides/slide67.xml><?xml version="1.0" encoding="utf-8"?>
+<file path=ppt/slides/slide71.xml><?xml version="1.0" encoding="utf-8"?>
 <p:sld xmlns:a="http://schemas.openxmlformats.org/drawingml/2006/main" xmlns:r="http://schemas.openxmlformats.org/officeDocument/2006/relationships" xmlns:p="http://schemas.openxmlformats.org/presentationml/2006/main">
   <p:cSld>
     <p:spTree>
@@ -35195,17 +35778,10 @@
         <p:cNvGrpSpPr/>
         <p:nvPr/>
       </p:nvGrpSpPr>
-      <p:grpSpPr>
-        <a:xfrm>
-          <a:off x="0" y="0"/>
-          <a:ext cx="0" cy="0"/>
-          <a:chOff x="0" y="0"/>
-          <a:chExt cx="0" cy="0"/>
-        </a:xfrm>
-      </p:grpSpPr>
+      <p:grpSpPr/>
       <p:sp>
         <p:nvSpPr>
-          <p:cNvPr id="2" name="Başlık 1"/>
+          <p:cNvPr id="2" name="Title 1"/>
           <p:cNvSpPr>
             <a:spLocks noGrp="1"/>
           </p:cNvSpPr>
@@ -35216,15 +35792,18 @@
         <p:spPr/>
         <p:txBody>
           <a:bodyPr/>
-          <a:lstStyle/>
-          <a:p>
-            <a:endParaRPr lang="tr-TR"/>
+          <a:p>
+            <a:r>
+              <a:rPr lang="tr-TR" altLang="en-US"/>
+              <a:t>polymorphism (Çok Biçimlilik)</a:t>
+            </a:r>
+            <a:endParaRPr lang="tr-TR" altLang="en-US"/>
           </a:p>
         </p:txBody>
       </p:sp>
       <p:sp>
         <p:nvSpPr>
-          <p:cNvPr id="3" name="İçerik Yer Tutucusu 2"/>
+          <p:cNvPr id="3" name="Content Placeholder 2"/>
           <p:cNvSpPr>
             <a:spLocks noGrp="1"/>
           </p:cNvSpPr>
@@ -35235,13 +35814,64 @@
         <p:spPr/>
         <p:txBody>
           <a:bodyPr/>
-          <a:lstStyle/>
-          <a:p>
-            <a:r>
-              <a:rPr lang="tr-TR" dirty="0"/>
-              <a:t>Dinlediğiniz için teşekkürler</a:t>
-            </a:r>
-            <a:endParaRPr lang="tr-TR" dirty="0"/>
+          <a:p>
+            <a:r>
+              <a:rPr lang="en-US"/>
+              <a:t>Bir </a:t>
+            </a:r>
+            <a:r>
+              <a:rPr lang="tr-TR" altLang="en-US"/>
+              <a:t>reference </a:t>
+            </a:r>
+            <a:r>
+              <a:rPr lang="en-US"/>
+              <a:t>değişkeni, bildirilen başvuruyla aynı türdeki herhangi bir nesneye başvurabilir</a:t>
+            </a:r>
+            <a:r>
+              <a:rPr lang="tr-TR" altLang="en-US"/>
+              <a:t>.</a:t>
+            </a:r>
+            <a:r>
+              <a:rPr lang="en-US"/>
+              <a:t> </a:t>
+            </a:r>
+            <a:r>
+              <a:rPr lang="tr-TR" altLang="en-US"/>
+              <a:t>B</a:t>
+            </a:r>
+            <a:r>
+              <a:rPr lang="en-US"/>
+              <a:t>eyan edilen tipin herhangi bir alt tipine atıfta bulunabilir.</a:t>
+            </a:r>
+            <a:endParaRPr lang="en-US"/>
+          </a:p>
+          <a:p>
+            <a:r>
+              <a:rPr lang="en-US"/>
+              <a:t>Bir </a:t>
+            </a:r>
+            <a:r>
+              <a:rPr lang="tr-TR" altLang="en-US">
+                <a:sym typeface="+mn-ea"/>
+              </a:rPr>
+              <a:t>reference </a:t>
+            </a:r>
+            <a:r>
+              <a:rPr lang="en-US"/>
+              <a:t>değişkeninin türü, değişkenin başvurduğu nesne üzerinde çağrılabilecek yöntemleri belirler.</a:t>
+            </a:r>
+            <a:endParaRPr lang="en-US"/>
+          </a:p>
+          <a:p>
+            <a:r>
+              <a:rPr lang="en-US"/>
+              <a:t>Bir referans değişkeni, bir sınıf tipi veya bir arayüz tipi olarak bildirilebilir</a:t>
+            </a:r>
+            <a:r>
+              <a:rPr lang="tr-TR" altLang="en-US"/>
+              <a:t>.</a:t>
+            </a:r>
+            <a:endParaRPr lang="tr-TR" altLang="en-US"/>
           </a:p>
         </p:txBody>
       </p:sp>
@@ -35253,7 +35883,7 @@
 </p:sld>
 </file>
 
-<file path=ppt/slides/slide7.xml><?xml version="1.0" encoding="utf-8"?>
+<file path=ppt/slides/slide72.xml><?xml version="1.0" encoding="utf-8"?>
 <p:sld xmlns:a="http://schemas.openxmlformats.org/drawingml/2006/main" xmlns:r="http://schemas.openxmlformats.org/officeDocument/2006/relationships" xmlns:p="http://schemas.openxmlformats.org/presentationml/2006/main">
   <p:cSld>
     <p:spTree>
@@ -35262,17 +35892,10 @@
         <p:cNvGrpSpPr/>
         <p:nvPr/>
       </p:nvGrpSpPr>
-      <p:grpSpPr>
-        <a:xfrm>
-          <a:off x="0" y="0"/>
-          <a:ext cx="0" cy="0"/>
-          <a:chOff x="0" y="0"/>
-          <a:chExt cx="0" cy="0"/>
-        </a:xfrm>
-      </p:grpSpPr>
+      <p:grpSpPr/>
       <p:sp>
         <p:nvSpPr>
-          <p:cNvPr id="2" name="Başlık 1"/>
+          <p:cNvPr id="2" name="Title 1"/>
           <p:cNvSpPr>
             <a:spLocks noGrp="1"/>
           </p:cNvSpPr>
@@ -35283,19 +35906,167 @@
         <p:spPr/>
         <p:txBody>
           <a:bodyPr/>
-          <a:lstStyle/>
-          <a:p>
-            <a:r>
-              <a:rPr lang="tr-TR" dirty="0" err="1"/>
-              <a:t>Constants</a:t>
-            </a:r>
-            <a:endParaRPr lang="tr-TR" dirty="0"/>
+          <a:p>
+            <a:endParaRPr lang="en-US"/>
+          </a:p>
+        </p:txBody>
+      </p:sp>
+      <p:pic>
+        <p:nvPicPr>
+          <p:cNvPr id="4" name="Content Placeholder 3"/>
+          <p:cNvPicPr>
+            <a:picLocks noChangeAspect="1"/>
+          </p:cNvPicPr>
+          <p:nvPr>
+            <p:ph idx="1"/>
+          </p:nvPr>
+        </p:nvPicPr>
+        <p:blipFill>
+          <a:blip r:embed="rId1"/>
+          <a:stretch>
+            <a:fillRect/>
+          </a:stretch>
+        </p:blipFill>
+        <p:spPr>
+          <a:xfrm>
+            <a:off x="1226185" y="2762250"/>
+            <a:ext cx="9734550" cy="2514600"/>
+          </a:xfrm>
+          <a:prstGeom prst="rect">
+            <a:avLst/>
+          </a:prstGeom>
+        </p:spPr>
+      </p:pic>
+    </p:spTree>
+  </p:cSld>
+  <p:clrMapOvr>
+    <a:masterClrMapping/>
+  </p:clrMapOvr>
+</p:sld>
+</file>
+
+<file path=ppt/slides/slide73.xml><?xml version="1.0" encoding="utf-8"?>
+<p:sld xmlns:a="http://schemas.openxmlformats.org/drawingml/2006/main" xmlns:r="http://schemas.openxmlformats.org/officeDocument/2006/relationships" xmlns:p="http://schemas.openxmlformats.org/presentationml/2006/main">
+  <p:cSld>
+    <p:spTree>
+      <p:nvGrpSpPr>
+        <p:cNvPr id="1" name=""/>
+        <p:cNvGrpSpPr/>
+        <p:nvPr/>
+      </p:nvGrpSpPr>
+      <p:grpSpPr/>
+      <p:sp>
+        <p:nvSpPr>
+          <p:cNvPr id="3" name="Content Placeholder 2"/>
+          <p:cNvSpPr>
+            <a:spLocks noGrp="1"/>
+          </p:cNvSpPr>
+          <p:nvPr>
+            <p:ph idx="1"/>
+          </p:nvPr>
+        </p:nvSpPr>
+        <p:spPr>
+          <a:xfrm>
+            <a:off x="1141095" y="945515"/>
+            <a:ext cx="9906000" cy="5653405"/>
+          </a:xfrm>
+        </p:spPr>
+        <p:txBody>
+          <a:bodyPr>
+            <a:normAutofit fontScale="80000"/>
+          </a:bodyPr>
+          <a:p>
+            <a:r>
+              <a:rPr lang="tr-TR" altLang="en-US"/>
+              <a:t>Java da iki tür polymorphism desteklenir:</a:t>
+            </a:r>
+            <a:endParaRPr lang="tr-TR" altLang="en-US"/>
+          </a:p>
+          <a:p>
+            <a:r>
+              <a:rPr lang="tr-TR" altLang="en-US"/>
+              <a:t>1- compile-time polymorphism</a:t>
+            </a:r>
+            <a:endParaRPr lang="tr-TR" altLang="en-US"/>
+          </a:p>
+          <a:p>
+            <a:pPr marL="0" indent="0">
+              <a:buNone/>
+            </a:pPr>
+            <a:r>
+              <a:rPr lang="tr-TR" altLang="en-US"/>
+              <a:t>Derleme işlemi sırasında çözülen bir polimorfizm. Derleme zamanında Java, yöntem imzalarını kontrol ederek hangi yöntemin çağrılacağını bilir.Static binding, Early binding and overloading olarak da bilinir.</a:t>
+            </a:r>
+            <a:endParaRPr lang="tr-TR" altLang="en-US"/>
+          </a:p>
+          <a:p>
+            <a:r>
+              <a:rPr lang="tr-TR" altLang="en-US"/>
+              <a:t>2- run-time polymorphism</a:t>
+            </a:r>
+            <a:endParaRPr lang="tr-TR" altLang="en-US"/>
+          </a:p>
+          <a:p>
+            <a:pPr marL="0" indent="0">
+              <a:buNone/>
+            </a:pPr>
+            <a:r>
+              <a:rPr lang="tr-TR" altLang="en-US"/>
+              <a:t>Bir nesne çalışma zamanında işlevselliğe bağlandığında, bu çalışma zamanı çok biçimliliği olarak bilinir. Çalışma zamanı polimorfizmi, yöntemin geçersiz kılınmasıyla elde edilebilir. Java sanal makinesi, çağrılacak uygun yöntemi derleme zamanında değil, çalışma zamanında belirler. Yöntem geçersiz kılma, alt sınıfın üst sınıfta bildirilenle aynı yönteme sahip olduğunu söylüyor. Bunun anlamı, alt sınıf, üst sınıfından biri tarafından sağlanan yöntemin özel uygulamasını sağlıyorsa, yöntemi geçersiz kılma olarak bilinir.</a:t>
+            </a:r>
+            <a:endParaRPr lang="tr-TR" altLang="en-US"/>
+          </a:p>
+          <a:p>
+            <a:pPr marL="0" indent="0">
+              <a:buNone/>
+            </a:pPr>
+            <a:r>
+              <a:rPr lang="tr-TR" altLang="en-US"/>
+              <a:t>Dynamic binding, Late binding and overriding olarak da bilinir.</a:t>
+            </a:r>
+            <a:endParaRPr lang="tr-TR" altLang="en-US"/>
+          </a:p>
+        </p:txBody>
+      </p:sp>
+    </p:spTree>
+  </p:cSld>
+  <p:clrMapOvr>
+    <a:masterClrMapping/>
+  </p:clrMapOvr>
+</p:sld>
+</file>
+
+<file path=ppt/slides/slide74.xml><?xml version="1.0" encoding="utf-8"?>
+<p:sld xmlns:a="http://schemas.openxmlformats.org/drawingml/2006/main" xmlns:r="http://schemas.openxmlformats.org/officeDocument/2006/relationships" xmlns:p="http://schemas.openxmlformats.org/presentationml/2006/main">
+  <p:cSld>
+    <p:spTree>
+      <p:nvGrpSpPr>
+        <p:cNvPr id="1" name=""/>
+        <p:cNvGrpSpPr/>
+        <p:nvPr/>
+      </p:nvGrpSpPr>
+      <p:grpSpPr/>
+      <p:sp>
+        <p:nvSpPr>
+          <p:cNvPr id="2" name="Title 1"/>
+          <p:cNvSpPr>
+            <a:spLocks noGrp="1"/>
+          </p:cNvSpPr>
+          <p:nvPr>
+            <p:ph type="title"/>
+          </p:nvPr>
+        </p:nvSpPr>
+        <p:spPr/>
+        <p:txBody>
+          <a:bodyPr/>
+          <a:p>
+            <a:endParaRPr lang="en-US"/>
           </a:p>
         </p:txBody>
       </p:sp>
       <p:sp>
         <p:nvSpPr>
-          <p:cNvPr id="3" name="İçerik Yer Tutucusu 2"/>
+          <p:cNvPr id="3" name="Content Placeholder 2"/>
           <p:cNvSpPr>
             <a:spLocks noGrp="1"/>
           </p:cNvSpPr>
@@ -35306,93 +36077,431 @@
         <p:spPr/>
         <p:txBody>
           <a:bodyPr/>
-          <a:lstStyle/>
-          <a:p>
-            <a:r>
-              <a:rPr lang="tr-TR" dirty="0"/>
-              <a:t>final </a:t>
-            </a:r>
-            <a:r>
-              <a:rPr lang="tr-TR" dirty="0" err="1"/>
-              <a:t>keyword</a:t>
-            </a:r>
-            <a:r>
-              <a:rPr lang="tr-TR" dirty="0"/>
-              <a:t> ‘ü kullanılarak yapılır.</a:t>
-            </a:r>
-            <a:endParaRPr lang="tr-TR" dirty="0"/>
-          </a:p>
-          <a:p>
-            <a:r>
-              <a:rPr lang="tr-TR" dirty="0"/>
-              <a:t>Uygulama başladıktan sonra değiştirilemez</a:t>
-            </a:r>
-            <a:endParaRPr lang="tr-TR" dirty="0"/>
-          </a:p>
-          <a:p>
-            <a:r>
-              <a:rPr lang="tr-TR" dirty="0"/>
-              <a:t>Bildirimde veya </a:t>
-            </a:r>
-            <a:r>
-              <a:rPr lang="tr-TR" dirty="0" err="1"/>
-              <a:t>constructor’da</a:t>
-            </a:r>
-            <a:r>
-              <a:rPr lang="tr-TR" dirty="0"/>
-              <a:t> bir değer atanmalıdır</a:t>
-            </a:r>
-            <a:endParaRPr lang="tr-TR" dirty="0"/>
-          </a:p>
-          <a:p>
-            <a:r>
-              <a:rPr lang="tr-TR" dirty="0"/>
-              <a:t>Mesela : </a:t>
-            </a:r>
-            <a:r>
-              <a:rPr lang="en-US" dirty="0" err="1"/>
-              <a:t>Math.PI</a:t>
-            </a:r>
-            <a:r>
-              <a:rPr lang="en-US" dirty="0"/>
-              <a:t> </a:t>
-            </a:r>
-            <a:r>
-              <a:rPr lang="tr-TR" dirty="0"/>
-              <a:t>ve </a:t>
-            </a:r>
-            <a:r>
-              <a:rPr lang="en-US" dirty="0" err="1"/>
-              <a:t>Math.E</a:t>
-            </a:r>
-            <a:r>
-              <a:rPr lang="en-US" dirty="0"/>
-              <a:t> final static</a:t>
-            </a:r>
-            <a:r>
-              <a:rPr lang="tr-TR" dirty="0"/>
-              <a:t> </a:t>
-            </a:r>
-            <a:r>
-              <a:rPr lang="tr-TR" dirty="0" err="1"/>
-              <a:t>fields</a:t>
-            </a:r>
-            <a:r>
-              <a:rPr lang="tr-TR" dirty="0"/>
-              <a:t> ‘</a:t>
-            </a:r>
-            <a:r>
-              <a:rPr lang="tr-TR" dirty="0" err="1"/>
-              <a:t>dır</a:t>
-            </a:r>
-            <a:r>
-              <a:rPr lang="tr-TR" dirty="0"/>
-              <a:t>.</a:t>
-            </a:r>
-            <a:endParaRPr lang="tr-TR" dirty="0"/>
+          <a:p>
+            <a:r>
+              <a:rPr lang="en-US"/>
+              <a:t>Bir program bir üst sınıf değişkeni aracılığıyla bir yöntemi çağırdığında, üst sınıf değişkeninde depolanan referansın türüne göre yöntemin doğru alt sınıf sürümü çağrılır.</a:t>
+            </a:r>
+            <a:endParaRPr lang="en-US"/>
           </a:p>
         </p:txBody>
       </p:sp>
+    </p:spTree>
+  </p:cSld>
+  <p:clrMapOvr>
+    <a:masterClrMapping/>
+  </p:clrMapOvr>
+</p:sld>
+</file>
+
+<file path=ppt/slides/slide75.xml><?xml version="1.0" encoding="utf-8"?>
+<p:sld xmlns:a="http://schemas.openxmlformats.org/drawingml/2006/main" xmlns:r="http://schemas.openxmlformats.org/officeDocument/2006/relationships" xmlns:p="http://schemas.openxmlformats.org/presentationml/2006/main">
+  <p:cSld>
+    <p:spTree>
+      <p:nvGrpSpPr>
+        <p:cNvPr id="1" name=""/>
+        <p:cNvGrpSpPr/>
+        <p:nvPr/>
+      </p:nvGrpSpPr>
+      <p:grpSpPr/>
+      <p:sp>
+        <p:nvSpPr>
+          <p:cNvPr id="2" name="Title 1"/>
+          <p:cNvSpPr>
+            <a:spLocks noGrp="1"/>
+          </p:cNvSpPr>
+          <p:nvPr>
+            <p:ph type="title"/>
+          </p:nvPr>
+        </p:nvSpPr>
+        <p:spPr/>
+        <p:txBody>
+          <a:bodyPr/>
+          <a:p>
+            <a:endParaRPr lang="en-US"/>
+          </a:p>
+        </p:txBody>
+      </p:sp>
+      <p:pic>
+        <p:nvPicPr>
+          <p:cNvPr id="4" name="Content Placeholder 3"/>
+          <p:cNvPicPr>
+            <a:picLocks noChangeAspect="1"/>
+          </p:cNvPicPr>
+          <p:nvPr>
+            <p:ph idx="1"/>
+          </p:nvPr>
+        </p:nvPicPr>
+        <p:blipFill>
+          <a:blip r:embed="rId1"/>
+          <a:stretch>
+            <a:fillRect/>
+          </a:stretch>
+        </p:blipFill>
+        <p:spPr>
+          <a:xfrm>
+            <a:off x="625475" y="749300"/>
+            <a:ext cx="11062970" cy="5041900"/>
+          </a:xfrm>
+          <a:prstGeom prst="rect">
+            <a:avLst/>
+          </a:prstGeom>
+        </p:spPr>
+      </p:pic>
+    </p:spTree>
+  </p:cSld>
+  <p:clrMapOvr>
+    <a:masterClrMapping/>
+  </p:clrMapOvr>
+</p:sld>
+</file>
+
+<file path=ppt/slides/slide76.xml><?xml version="1.0" encoding="utf-8"?>
+<p:sld xmlns:a="http://schemas.openxmlformats.org/drawingml/2006/main" xmlns:r="http://schemas.openxmlformats.org/officeDocument/2006/relationships" xmlns:p="http://schemas.openxmlformats.org/presentationml/2006/main">
+  <p:cSld>
+    <p:spTree>
+      <p:nvGrpSpPr>
+        <p:cNvPr id="1" name=""/>
+        <p:cNvGrpSpPr/>
+        <p:nvPr/>
+      </p:nvGrpSpPr>
+      <p:grpSpPr/>
+      <p:sp>
+        <p:nvSpPr>
+          <p:cNvPr id="2" name="Title 1"/>
+          <p:cNvSpPr>
+            <a:spLocks noGrp="1"/>
+          </p:cNvSpPr>
+          <p:nvPr>
+            <p:ph type="title"/>
+          </p:nvPr>
+        </p:nvSpPr>
+        <p:spPr/>
+        <p:txBody>
+          <a:bodyPr/>
+          <a:p>
+            <a:r>
+              <a:rPr lang="en-US"/>
+              <a:t>Casting Objects</a:t>
+            </a:r>
+            <a:endParaRPr lang="en-US"/>
+          </a:p>
+        </p:txBody>
+      </p:sp>
+      <p:sp>
+        <p:nvSpPr>
+          <p:cNvPr id="3" name="Content Placeholder 2"/>
+          <p:cNvSpPr>
+            <a:spLocks noGrp="1"/>
+          </p:cNvSpPr>
+          <p:nvPr>
+            <p:ph sz="half" idx="1"/>
+          </p:nvPr>
+        </p:nvSpPr>
+        <p:spPr/>
+        <p:txBody>
+          <a:bodyPr/>
+          <a:p>
+            <a:r>
+              <a:rPr lang="en-US"/>
+              <a:t>Derleyiciye, nesnenin sınıf hiyerarşisinde farklı bir tür kullanmasını söylememize izin verir.</a:t>
+            </a:r>
+            <a:endParaRPr lang="en-US"/>
+          </a:p>
+          <a:p>
+            <a:r>
+              <a:rPr lang="en-US"/>
+              <a:t>Casting to a more generalized type (upcast)</a:t>
+            </a:r>
+            <a:endParaRPr lang="en-US"/>
+          </a:p>
+        </p:txBody>
+      </p:sp>
+      <p:pic>
+        <p:nvPicPr>
+          <p:cNvPr id="6" name="Content Placeholder 5"/>
+          <p:cNvPicPr>
+            <a:picLocks noChangeAspect="1"/>
+          </p:cNvPicPr>
+          <p:nvPr>
+            <p:ph sz="half" idx="2"/>
+          </p:nvPr>
+        </p:nvPicPr>
+        <p:blipFill>
+          <a:blip r:embed="rId1"/>
+          <a:stretch>
+            <a:fillRect/>
+          </a:stretch>
+        </p:blipFill>
+        <p:spPr>
+          <a:xfrm>
+            <a:off x="5909945" y="2096770"/>
+            <a:ext cx="6140450" cy="2372995"/>
+          </a:xfrm>
+          <a:prstGeom prst="rect">
+            <a:avLst/>
+          </a:prstGeom>
+        </p:spPr>
+      </p:pic>
+    </p:spTree>
+  </p:cSld>
+  <p:clrMapOvr>
+    <a:masterClrMapping/>
+  </p:clrMapOvr>
+</p:sld>
+</file>
+
+<file path=ppt/slides/slide77.xml><?xml version="1.0" encoding="utf-8"?>
+<p:sld xmlns:a="http://schemas.openxmlformats.org/drawingml/2006/main" xmlns:r="http://schemas.openxmlformats.org/officeDocument/2006/relationships" xmlns:p="http://schemas.openxmlformats.org/presentationml/2006/main">
+  <p:cSld>
+    <p:spTree>
+      <p:nvGrpSpPr>
+        <p:cNvPr id="1" name=""/>
+        <p:cNvGrpSpPr/>
+        <p:nvPr/>
+      </p:nvGrpSpPr>
+      <p:grpSpPr/>
+      <p:sp>
+        <p:nvSpPr>
+          <p:cNvPr id="2" name="Title 1"/>
+          <p:cNvSpPr>
+            <a:spLocks noGrp="1"/>
+          </p:cNvSpPr>
+          <p:nvPr>
+            <p:ph type="title"/>
+          </p:nvPr>
+        </p:nvSpPr>
+        <p:spPr/>
+        <p:txBody>
+          <a:bodyPr/>
+          <a:p>
+            <a:endParaRPr lang="en-US"/>
+          </a:p>
+        </p:txBody>
+      </p:sp>
+      <p:sp>
+        <p:nvSpPr>
+          <p:cNvPr id="3" name="Content Placeholder 2"/>
+          <p:cNvSpPr>
+            <a:spLocks noGrp="1"/>
+          </p:cNvSpPr>
+          <p:nvPr>
+            <p:ph sz="half" idx="1"/>
+          </p:nvPr>
+        </p:nvSpPr>
+        <p:spPr/>
+        <p:txBody>
+          <a:bodyPr/>
+          <a:p>
+            <a:r>
+              <a:rPr lang="en-US"/>
+              <a:t>Casting to a more specialized type (downcast)</a:t>
+            </a:r>
+            <a:endParaRPr lang="en-US"/>
+          </a:p>
+          <a:p>
+            <a:r>
+              <a:rPr lang="en-US"/>
+              <a:t>Bir üst tipten alt tipe geçiş, doğru tipe doğru yapıldığı sürece geçerlidir.</a:t>
+            </a:r>
+            <a:endParaRPr lang="en-US"/>
+          </a:p>
+        </p:txBody>
+      </p:sp>
+      <p:pic>
+        <p:nvPicPr>
+          <p:cNvPr id="5" name="Content Placeholder 4"/>
+          <p:cNvPicPr>
+            <a:picLocks noChangeAspect="1"/>
+          </p:cNvPicPr>
+          <p:nvPr>
+            <p:ph sz="half" idx="2"/>
+          </p:nvPr>
+        </p:nvPicPr>
+        <p:blipFill>
+          <a:blip r:embed="rId1"/>
+          <a:stretch>
+            <a:fillRect/>
+          </a:stretch>
+        </p:blipFill>
+        <p:spPr>
+          <a:xfrm>
+            <a:off x="6172200" y="2845435"/>
+            <a:ext cx="4874895" cy="1531620"/>
+          </a:xfrm>
+          <a:prstGeom prst="rect">
+            <a:avLst/>
+          </a:prstGeom>
+        </p:spPr>
+      </p:pic>
+    </p:spTree>
+  </p:cSld>
+  <p:clrMapOvr>
+    <a:masterClrMapping/>
+  </p:clrMapOvr>
+</p:sld>
+</file>
+
+<file path=ppt/slides/slide78.xml><?xml version="1.0" encoding="utf-8"?>
+<p:sld xmlns:a="http://schemas.openxmlformats.org/drawingml/2006/main" xmlns:r="http://schemas.openxmlformats.org/officeDocument/2006/relationships" xmlns:p="http://schemas.openxmlformats.org/presentationml/2006/main">
+  <p:cSld>
+    <p:spTree>
+      <p:nvGrpSpPr>
+        <p:cNvPr id="1" name=""/>
+        <p:cNvGrpSpPr/>
+        <p:nvPr/>
+      </p:nvGrpSpPr>
+      <p:grpSpPr/>
+      <p:sp>
+        <p:nvSpPr>
+          <p:cNvPr id="2" name="Title 1"/>
+          <p:cNvSpPr>
+            <a:spLocks noGrp="1"/>
+          </p:cNvSpPr>
+          <p:nvPr>
+            <p:ph type="title"/>
+          </p:nvPr>
+        </p:nvSpPr>
+        <p:spPr/>
+        <p:txBody>
+          <a:bodyPr/>
+          <a:p>
+            <a:endParaRPr lang="en-US"/>
+          </a:p>
+        </p:txBody>
+      </p:sp>
+      <p:sp>
+        <p:nvSpPr>
+          <p:cNvPr id="3" name="Content Placeholder 2"/>
+          <p:cNvSpPr>
+            <a:spLocks noGrp="1"/>
+          </p:cNvSpPr>
+          <p:nvPr>
+            <p:ph sz="half" idx="1"/>
+          </p:nvPr>
+        </p:nvSpPr>
+        <p:spPr/>
+        <p:txBody>
+          <a:bodyPr/>
+          <a:p>
+            <a:r>
+              <a:rPr lang="en-US"/>
+              <a:t>Bir downcast geçerli değilse, çalışma zamanında bir ClassCastException oluşturulur </a:t>
+            </a:r>
+            <a:endParaRPr lang="en-US"/>
+          </a:p>
+        </p:txBody>
+      </p:sp>
+      <p:pic>
+        <p:nvPicPr>
+          <p:cNvPr id="5" name="Content Placeholder 4"/>
+          <p:cNvPicPr>
+            <a:picLocks noChangeAspect="1"/>
+          </p:cNvPicPr>
+          <p:nvPr>
+            <p:ph sz="half" idx="2"/>
+          </p:nvPr>
+        </p:nvPicPr>
+        <p:blipFill>
+          <a:blip r:embed="rId1"/>
+          <a:stretch>
+            <a:fillRect/>
+          </a:stretch>
+        </p:blipFill>
+        <p:spPr>
+          <a:xfrm>
+            <a:off x="728345" y="3834130"/>
+            <a:ext cx="10639425" cy="1957070"/>
+          </a:xfrm>
+          <a:prstGeom prst="rect">
+            <a:avLst/>
+          </a:prstGeom>
+        </p:spPr>
+      </p:pic>
+    </p:spTree>
+  </p:cSld>
+  <p:clrMapOvr>
+    <a:masterClrMapping/>
+  </p:clrMapOvr>
+</p:sld>
+</file>
+
+<file path=ppt/slides/slide79.xml><?xml version="1.0" encoding="utf-8"?>
+<p:sld xmlns:a="http://schemas.openxmlformats.org/drawingml/2006/main" xmlns:r="http://schemas.openxmlformats.org/officeDocument/2006/relationships" xmlns:p="http://schemas.openxmlformats.org/presentationml/2006/main">
+  <p:cSld>
+    <p:spTree>
+      <p:nvGrpSpPr>
+        <p:cNvPr id="1" name=""/>
+        <p:cNvGrpSpPr/>
+        <p:nvPr/>
+      </p:nvGrpSpPr>
+      <p:grpSpPr/>
+      <p:sp>
+        <p:nvSpPr>
+          <p:cNvPr id="2" name="Title 1"/>
+          <p:cNvSpPr>
+            <a:spLocks noGrp="1"/>
+          </p:cNvSpPr>
+          <p:nvPr>
+            <p:ph type="title"/>
+          </p:nvPr>
+        </p:nvSpPr>
+        <p:spPr/>
+        <p:txBody>
+          <a:bodyPr/>
+          <a:p>
+            <a:endParaRPr lang="en-US"/>
+          </a:p>
+        </p:txBody>
+      </p:sp>
+      <p:sp>
+        <p:nvSpPr>
+          <p:cNvPr id="3" name="Content Placeholder 2"/>
+          <p:cNvSpPr>
+            <a:spLocks noGrp="1"/>
+          </p:cNvSpPr>
+          <p:nvPr>
+            <p:ph sz="half" idx="1"/>
+          </p:nvPr>
+        </p:nvSpPr>
+        <p:spPr/>
+        <p:txBody>
+          <a:bodyPr/>
+          <a:p>
+            <a:r>
+              <a:rPr lang="en-US"/>
+              <a:t>instanceof operatörü, başvurulan nesnenin türünü test eder.</a:t>
+            </a:r>
+            <a:endParaRPr lang="en-US"/>
+          </a:p>
+        </p:txBody>
+      </p:sp>
+      <p:pic>
+        <p:nvPicPr>
+          <p:cNvPr id="5" name="Content Placeholder 4"/>
+          <p:cNvPicPr>
+            <a:picLocks noChangeAspect="1"/>
+          </p:cNvPicPr>
+          <p:nvPr>
+            <p:ph sz="half" idx="2"/>
+          </p:nvPr>
+        </p:nvPicPr>
+        <p:blipFill>
+          <a:blip r:embed="rId1"/>
+          <a:stretch>
+            <a:fillRect/>
+          </a:stretch>
+        </p:blipFill>
+        <p:spPr>
+          <a:xfrm>
+            <a:off x="1144905" y="3605530"/>
+            <a:ext cx="9902190" cy="1908810"/>
+          </a:xfrm>
+          <a:prstGeom prst="rect">
+            <a:avLst/>
+          </a:prstGeom>
+        </p:spPr>
+      </p:pic>
     </p:spTree>
   </p:cSld>
   <p:clrMapOvr>
@@ -35474,6 +36583,1051 @@
 </p:sld>
 </file>
 
+<file path=ppt/slides/slide80.xml><?xml version="1.0" encoding="utf-8"?>
+<p:sld xmlns:a="http://schemas.openxmlformats.org/drawingml/2006/main" xmlns:r="http://schemas.openxmlformats.org/officeDocument/2006/relationships" xmlns:p="http://schemas.openxmlformats.org/presentationml/2006/main">
+  <p:cSld>
+    <p:spTree>
+      <p:nvGrpSpPr>
+        <p:cNvPr id="1" name=""/>
+        <p:cNvGrpSpPr/>
+        <p:nvPr/>
+      </p:nvGrpSpPr>
+      <p:grpSpPr/>
+      <p:sp>
+        <p:nvSpPr>
+          <p:cNvPr id="2" name="Title 1"/>
+          <p:cNvSpPr>
+            <a:spLocks noGrp="1"/>
+          </p:cNvSpPr>
+          <p:nvPr>
+            <p:ph type="title"/>
+          </p:nvPr>
+        </p:nvSpPr>
+        <p:spPr/>
+        <p:txBody>
+          <a:bodyPr/>
+          <a:p>
+            <a:endParaRPr lang="en-US"/>
+          </a:p>
+        </p:txBody>
+      </p:sp>
+      <p:sp>
+        <p:nvSpPr>
+          <p:cNvPr id="3" name="Content Placeholder 2"/>
+          <p:cNvSpPr>
+            <a:spLocks noGrp="1"/>
+          </p:cNvSpPr>
+          <p:nvPr>
+            <p:ph sz="half" idx="1"/>
+          </p:nvPr>
+        </p:nvSpPr>
+        <p:spPr/>
+        <p:txBody>
+          <a:bodyPr>
+            <a:normAutofit lnSpcReduction="10000"/>
+          </a:bodyPr>
+          <a:p>
+            <a:r>
+              <a:rPr lang="en-US"/>
+              <a:t>Late Binding(Geç bağlama): Polymorphism oluştuğu anda(çalıştırıldığı sırada) nesnenin bağlanacağı nesne türünün seçilmesi ve buna uygun  işlemlerin yapılması sürecidir. Polymorphism olmadığı sürece geç bağlama kavramından bahsedemeyiz.</a:t>
+            </a:r>
+            <a:endParaRPr lang="en-US"/>
+          </a:p>
+        </p:txBody>
+      </p:sp>
+      <p:sp>
+        <p:nvSpPr>
+          <p:cNvPr id="4" name="Content Placeholder 3"/>
+          <p:cNvSpPr>
+            <a:spLocks noGrp="1"/>
+          </p:cNvSpPr>
+          <p:nvPr>
+            <p:ph sz="half" idx="2"/>
+          </p:nvPr>
+        </p:nvSpPr>
+        <p:spPr/>
+        <p:txBody>
+          <a:bodyPr/>
+          <a:p>
+            <a:endParaRPr lang="en-US"/>
+          </a:p>
+        </p:txBody>
+      </p:sp>
+    </p:spTree>
+  </p:cSld>
+  <p:clrMapOvr>
+    <a:masterClrMapping/>
+  </p:clrMapOvr>
+</p:sld>
+</file>
+
+<file path=ppt/slides/slide81.xml><?xml version="1.0" encoding="utf-8"?>
+<p:sld xmlns:a="http://schemas.openxmlformats.org/drawingml/2006/main" xmlns:r="http://schemas.openxmlformats.org/officeDocument/2006/relationships" xmlns:p="http://schemas.openxmlformats.org/presentationml/2006/main">
+  <p:cSld>
+    <p:spTree>
+      <p:nvGrpSpPr>
+        <p:cNvPr id="1" name=""/>
+        <p:cNvGrpSpPr/>
+        <p:nvPr/>
+      </p:nvGrpSpPr>
+      <p:grpSpPr/>
+      <p:sp>
+        <p:nvSpPr>
+          <p:cNvPr id="2" name="Title 1"/>
+          <p:cNvSpPr>
+            <a:spLocks noGrp="1"/>
+          </p:cNvSpPr>
+          <p:nvPr>
+            <p:ph type="title"/>
+          </p:nvPr>
+        </p:nvSpPr>
+        <p:spPr/>
+        <p:txBody>
+          <a:bodyPr/>
+          <a:p>
+            <a:r>
+              <a:rPr lang="tr-TR" altLang="en-US"/>
+              <a:t>Avantajlar</a:t>
+            </a:r>
+            <a:endParaRPr lang="tr-TR" altLang="en-US"/>
+          </a:p>
+        </p:txBody>
+      </p:sp>
+      <p:sp>
+        <p:nvSpPr>
+          <p:cNvPr id="3" name="Content Placeholder 2"/>
+          <p:cNvSpPr>
+            <a:spLocks noGrp="1"/>
+          </p:cNvSpPr>
+          <p:nvPr>
+            <p:ph sz="half" idx="1"/>
+          </p:nvPr>
+        </p:nvSpPr>
+        <p:spPr>
+          <a:xfrm>
+            <a:off x="1141095" y="1694815"/>
+            <a:ext cx="4878705" cy="5011420"/>
+          </a:xfrm>
+        </p:spPr>
+        <p:txBody>
+          <a:bodyPr>
+            <a:normAutofit fontScale="90000"/>
+          </a:bodyPr>
+          <a:p>
+            <a:r>
+              <a:rPr lang="tr-TR" altLang="en-US"/>
+              <a:t>Overload methodlar için</a:t>
+            </a:r>
+            <a:r>
+              <a:rPr lang="en-US"/>
+              <a:t> benzer veya yakından ilişkili işlevleri gerçekleştiren yöntemlere ortak bir ad aracılığıyla erişilmesine olanak tanır.</a:t>
+            </a:r>
+            <a:endParaRPr lang="en-US"/>
+          </a:p>
+          <a:p>
+            <a:pPr marL="0" indent="0">
+              <a:buNone/>
+            </a:pPr>
+            <a:r>
+              <a:rPr lang="en-US"/>
+              <a:t>Örneğin, bir program int, kayan nokta veya çift tip olabilen bir dizi sayı üzerinde işlemler gerçekleştirir. Yöntem aşırı yüklemesi, işlem dizisini işlemek için aynı ada ve farklı türde parametrelere sahip üç yöntem tanımlamanıza olanak tanır.</a:t>
+            </a:r>
+            <a:endParaRPr lang="en-US"/>
+          </a:p>
+        </p:txBody>
+      </p:sp>
+      <p:sp>
+        <p:nvSpPr>
+          <p:cNvPr id="4" name="Content Placeholder 3"/>
+          <p:cNvSpPr>
+            <a:spLocks noGrp="1"/>
+          </p:cNvSpPr>
+          <p:nvPr>
+            <p:ph sz="half" idx="2"/>
+          </p:nvPr>
+        </p:nvSpPr>
+        <p:spPr>
+          <a:xfrm>
+            <a:off x="6172200" y="1694815"/>
+            <a:ext cx="4874895" cy="4251960"/>
+          </a:xfrm>
+        </p:spPr>
+        <p:txBody>
+          <a:bodyPr/>
+          <a:p>
+            <a:r>
+              <a:rPr lang="en-US"/>
+              <a:t>Bir sınıfın nesnelerini başlatmak için farklı yollara izin veren yapıcılar üzerinde yöntem aşırı yüklemesi uygulanabilir.</a:t>
+            </a:r>
+            <a:endParaRPr lang="en-US"/>
+          </a:p>
+          <a:p>
+            <a:pPr marL="0" indent="0">
+              <a:buNone/>
+            </a:pPr>
+            <a:r>
+              <a:rPr lang="tr-TR" altLang="en-US"/>
+              <a:t>F</a:t>
+            </a:r>
+            <a:r>
+              <a:rPr lang="en-US"/>
+              <a:t>arklı başlatma türlerini işlemek için birden çok oluşturucu tanımlamanıza olanak tanır.</a:t>
+            </a:r>
+            <a:endParaRPr lang="en-US"/>
+          </a:p>
+        </p:txBody>
+      </p:sp>
+    </p:spTree>
+  </p:cSld>
+  <p:clrMapOvr>
+    <a:masterClrMapping/>
+  </p:clrMapOvr>
+</p:sld>
+</file>
+
+<file path=ppt/slides/slide82.xml><?xml version="1.0" encoding="utf-8"?>
+<p:sld xmlns:a="http://schemas.openxmlformats.org/drawingml/2006/main" xmlns:r="http://schemas.openxmlformats.org/officeDocument/2006/relationships" xmlns:p="http://schemas.openxmlformats.org/presentationml/2006/main">
+  <p:cSld>
+    <p:spTree>
+      <p:nvGrpSpPr>
+        <p:cNvPr id="1" name=""/>
+        <p:cNvGrpSpPr/>
+        <p:nvPr/>
+      </p:nvGrpSpPr>
+      <p:grpSpPr/>
+      <p:sp>
+        <p:nvSpPr>
+          <p:cNvPr id="2" name="Title 1"/>
+          <p:cNvSpPr>
+            <a:spLocks noGrp="1"/>
+          </p:cNvSpPr>
+          <p:nvPr>
+            <p:ph type="title"/>
+          </p:nvPr>
+        </p:nvSpPr>
+        <p:spPr/>
+        <p:txBody>
+          <a:bodyPr/>
+          <a:p>
+            <a:endParaRPr lang="en-US"/>
+          </a:p>
+        </p:txBody>
+      </p:sp>
+      <p:sp>
+        <p:nvSpPr>
+          <p:cNvPr id="3" name="Content Placeholder 2"/>
+          <p:cNvSpPr>
+            <a:spLocks noGrp="1"/>
+          </p:cNvSpPr>
+          <p:nvPr>
+            <p:ph sz="half" idx="1"/>
+          </p:nvPr>
+        </p:nvSpPr>
+        <p:spPr/>
+        <p:txBody>
+          <a:bodyPr/>
+          <a:p>
+            <a:r>
+              <a:rPr lang="tr-TR" altLang="en-US"/>
+              <a:t>(Overriding)</a:t>
+            </a:r>
+            <a:r>
+              <a:rPr lang="en-US"/>
+              <a:t>bir alt sınıfın, bir üst sınıfın sağladığı tüm genel tanımları kullanmasına ve geçersiz kılınan yöntemler aracılığıyla özel tanımlar eklemesine olanak tanır.</a:t>
+            </a:r>
+            <a:endParaRPr lang="en-US"/>
+          </a:p>
+        </p:txBody>
+      </p:sp>
+      <p:sp>
+        <p:nvSpPr>
+          <p:cNvPr id="4" name="Content Placeholder 3"/>
+          <p:cNvSpPr>
+            <a:spLocks noGrp="1"/>
+          </p:cNvSpPr>
+          <p:nvPr>
+            <p:ph sz="half" idx="2"/>
+          </p:nvPr>
+        </p:nvSpPr>
+        <p:spPr/>
+        <p:txBody>
+          <a:bodyPr/>
+          <a:p>
+            <a:r>
+              <a:rPr lang="tr-TR" altLang="en-US"/>
+              <a:t>(Overriding)</a:t>
+            </a:r>
+            <a:r>
+              <a:rPr lang="en-US"/>
+              <a:t> yeniden derlemeye gerek kalmadan mevcut sınıfların kodun yeniden kullanılmasını sağlamak için kalıtımla birlikte çalışır.</a:t>
+            </a:r>
+            <a:endParaRPr lang="en-US"/>
+          </a:p>
+        </p:txBody>
+      </p:sp>
+    </p:spTree>
+  </p:cSld>
+  <p:clrMapOvr>
+    <a:masterClrMapping/>
+  </p:clrMapOvr>
+</p:sld>
+</file>
+
+<file path=ppt/slides/slide83.xml><?xml version="1.0" encoding="utf-8"?>
+<p:sld xmlns:a="http://schemas.openxmlformats.org/drawingml/2006/main" xmlns:r="http://schemas.openxmlformats.org/officeDocument/2006/relationships" xmlns:p="http://schemas.openxmlformats.org/presentationml/2006/main">
+  <p:cSld>
+    <p:spTree>
+      <p:nvGrpSpPr>
+        <p:cNvPr id="1" name=""/>
+        <p:cNvGrpSpPr/>
+        <p:nvPr/>
+      </p:nvGrpSpPr>
+      <p:grpSpPr/>
+      <p:sp>
+        <p:nvSpPr>
+          <p:cNvPr id="2" name="Title 1"/>
+          <p:cNvSpPr>
+            <a:spLocks noGrp="1"/>
+          </p:cNvSpPr>
+          <p:nvPr>
+            <p:ph type="title"/>
+          </p:nvPr>
+        </p:nvSpPr>
+        <p:spPr/>
+        <p:txBody>
+          <a:bodyPr/>
+          <a:p>
+            <a:endParaRPr lang="en-US"/>
+          </a:p>
+        </p:txBody>
+      </p:sp>
+      <p:sp>
+        <p:nvSpPr>
+          <p:cNvPr id="3" name="Content Placeholder 2"/>
+          <p:cNvSpPr>
+            <a:spLocks noGrp="1"/>
+          </p:cNvSpPr>
+          <p:nvPr>
+            <p:ph sz="half" idx="1"/>
+          </p:nvPr>
+        </p:nvSpPr>
+        <p:spPr/>
+        <p:txBody>
+          <a:bodyPr>
+            <a:normAutofit lnSpcReduction="20000"/>
+          </a:bodyPr>
+          <a:p>
+            <a:r>
+              <a:rPr lang="en-US"/>
+              <a:t>Polimorfizmin dezavantajlarından biri, geliştiricilerin kodlarda polimorfizmi uygulamayı zor bulmalarıdır.</a:t>
+            </a:r>
+            <a:endParaRPr lang="en-US"/>
+          </a:p>
+          <a:p>
+            <a:r>
+              <a:rPr lang="en-US"/>
+              <a:t>Polimorfizm, programın okunabilirliğini </a:t>
+            </a:r>
+            <a:r>
+              <a:rPr lang="tr-TR" altLang="en-US"/>
+              <a:t>azaltabilir</a:t>
+            </a:r>
+            <a:r>
+              <a:rPr lang="en-US"/>
+              <a:t>. Gerçek yürütme zamanını belirlemek için programın çalışma zamanı davranışını tanımlamanız </a:t>
+            </a:r>
+            <a:r>
+              <a:rPr lang="tr-TR" altLang="en-US"/>
+              <a:t>gerekebilir</a:t>
+            </a:r>
+            <a:r>
+              <a:rPr lang="en-US"/>
+              <a:t>.</a:t>
+            </a:r>
+            <a:endParaRPr lang="en-US"/>
+          </a:p>
+        </p:txBody>
+      </p:sp>
+      <p:sp>
+        <p:nvSpPr>
+          <p:cNvPr id="4" name="Content Placeholder 3"/>
+          <p:cNvSpPr>
+            <a:spLocks noGrp="1"/>
+          </p:cNvSpPr>
+          <p:nvPr>
+            <p:ph sz="half" idx="2"/>
+          </p:nvPr>
+        </p:nvSpPr>
+        <p:spPr/>
+        <p:txBody>
+          <a:bodyPr>
+            <a:normAutofit lnSpcReduction="10000"/>
+          </a:bodyPr>
+          <a:p>
+            <a:r>
+              <a:rPr lang="en-US"/>
+              <a:t>Çalışma zamanı polimorfizmi, makinenin hangi yöntemin veya değişkenin çalıştırılacağına karar vermesi gerektiğinden performans sorununa yol açabilir, bu nedenle kararlar çalışma zamanında alınırken temel olarak performansları </a:t>
+            </a:r>
+            <a:r>
+              <a:rPr lang="tr-TR" altLang="en-US"/>
+              <a:t>düşürebilir</a:t>
+            </a:r>
+            <a:r>
+              <a:rPr lang="en-US"/>
+              <a:t>.</a:t>
+            </a:r>
+            <a:endParaRPr lang="en-US"/>
+          </a:p>
+        </p:txBody>
+      </p:sp>
+    </p:spTree>
+  </p:cSld>
+  <p:clrMapOvr>
+    <a:masterClrMapping/>
+  </p:clrMapOvr>
+</p:sld>
+</file>
+
+<file path=ppt/slides/slide84.xml><?xml version="1.0" encoding="utf-8"?>
+<p:sld xmlns:a="http://schemas.openxmlformats.org/drawingml/2006/main" xmlns:r="http://schemas.openxmlformats.org/officeDocument/2006/relationships" xmlns:p="http://schemas.openxmlformats.org/presentationml/2006/main">
+  <p:cSld>
+    <p:spTree>
+      <p:nvGrpSpPr>
+        <p:cNvPr id="1" name=""/>
+        <p:cNvGrpSpPr/>
+        <p:nvPr/>
+      </p:nvGrpSpPr>
+      <p:grpSpPr/>
+      <p:sp>
+        <p:nvSpPr>
+          <p:cNvPr id="2" name="Title 1"/>
+          <p:cNvSpPr>
+            <a:spLocks noGrp="1"/>
+          </p:cNvSpPr>
+          <p:nvPr>
+            <p:ph type="title"/>
+          </p:nvPr>
+        </p:nvSpPr>
+        <p:spPr/>
+        <p:txBody>
+          <a:bodyPr/>
+          <a:p>
+            <a:endParaRPr lang="en-US"/>
+          </a:p>
+        </p:txBody>
+      </p:sp>
+      <p:pic>
+        <p:nvPicPr>
+          <p:cNvPr id="5" name="Content Placeholder 4"/>
+          <p:cNvPicPr>
+            <a:picLocks noChangeAspect="1"/>
+          </p:cNvPicPr>
+          <p:nvPr>
+            <p:ph sz="half" idx="1"/>
+          </p:nvPr>
+        </p:nvPicPr>
+        <p:blipFill>
+          <a:blip r:embed="rId1"/>
+          <a:stretch>
+            <a:fillRect/>
+          </a:stretch>
+        </p:blipFill>
+        <p:spPr>
+          <a:xfrm>
+            <a:off x="128905" y="264160"/>
+            <a:ext cx="6260465" cy="2750185"/>
+          </a:xfrm>
+          <a:prstGeom prst="rect">
+            <a:avLst/>
+          </a:prstGeom>
+        </p:spPr>
+      </p:pic>
+      <p:pic>
+        <p:nvPicPr>
+          <p:cNvPr id="6" name="Content Placeholder 5"/>
+          <p:cNvPicPr>
+            <a:picLocks noChangeAspect="1"/>
+          </p:cNvPicPr>
+          <p:nvPr>
+            <p:ph sz="half" idx="2"/>
+          </p:nvPr>
+        </p:nvPicPr>
+        <p:blipFill>
+          <a:blip r:embed="rId2"/>
+          <a:stretch>
+            <a:fillRect/>
+          </a:stretch>
+        </p:blipFill>
+        <p:spPr>
+          <a:xfrm>
+            <a:off x="6785610" y="389890"/>
+            <a:ext cx="4874895" cy="2624455"/>
+          </a:xfrm>
+          <a:prstGeom prst="rect">
+            <a:avLst/>
+          </a:prstGeom>
+        </p:spPr>
+      </p:pic>
+      <p:pic>
+        <p:nvPicPr>
+          <p:cNvPr id="7" name="Picture 6"/>
+          <p:cNvPicPr>
+            <a:picLocks noChangeAspect="1"/>
+          </p:cNvPicPr>
+          <p:nvPr/>
+        </p:nvPicPr>
+        <p:blipFill>
+          <a:blip r:embed="rId3"/>
+          <a:stretch>
+            <a:fillRect/>
+          </a:stretch>
+        </p:blipFill>
+        <p:spPr>
+          <a:xfrm>
+            <a:off x="128905" y="3315970"/>
+            <a:ext cx="5413375" cy="2377440"/>
+          </a:xfrm>
+          <a:prstGeom prst="rect">
+            <a:avLst/>
+          </a:prstGeom>
+        </p:spPr>
+      </p:pic>
+      <p:pic>
+        <p:nvPicPr>
+          <p:cNvPr id="15" name="Picture 14"/>
+          <p:cNvPicPr>
+            <a:picLocks noChangeAspect="1"/>
+          </p:cNvPicPr>
+          <p:nvPr/>
+        </p:nvPicPr>
+        <p:blipFill>
+          <a:blip r:embed="rId4"/>
+          <a:stretch>
+            <a:fillRect/>
+          </a:stretch>
+        </p:blipFill>
+        <p:spPr>
+          <a:xfrm>
+            <a:off x="5793105" y="3099435"/>
+            <a:ext cx="5591175" cy="3619500"/>
+          </a:xfrm>
+          <a:prstGeom prst="rect">
+            <a:avLst/>
+          </a:prstGeom>
+        </p:spPr>
+      </p:pic>
+    </p:spTree>
+  </p:cSld>
+  <p:clrMapOvr>
+    <a:masterClrMapping/>
+  </p:clrMapOvr>
+</p:sld>
+</file>
+
+<file path=ppt/slides/slide85.xml><?xml version="1.0" encoding="utf-8"?>
+<p:sld xmlns:a="http://schemas.openxmlformats.org/drawingml/2006/main" xmlns:r="http://schemas.openxmlformats.org/officeDocument/2006/relationships" xmlns:p="http://schemas.openxmlformats.org/presentationml/2006/main">
+  <p:cSld>
+    <p:spTree>
+      <p:nvGrpSpPr>
+        <p:cNvPr id="1" name=""/>
+        <p:cNvGrpSpPr/>
+        <p:nvPr/>
+      </p:nvGrpSpPr>
+      <p:grpSpPr/>
+      <p:sp>
+        <p:nvSpPr>
+          <p:cNvPr id="2" name="Title 1"/>
+          <p:cNvSpPr>
+            <a:spLocks noGrp="1"/>
+          </p:cNvSpPr>
+          <p:nvPr>
+            <p:ph type="title"/>
+          </p:nvPr>
+        </p:nvSpPr>
+        <p:spPr/>
+        <p:txBody>
+          <a:bodyPr/>
+          <a:p>
+            <a:r>
+              <a:rPr lang="tr-TR" altLang="en-US"/>
+              <a:t>Çıktı</a:t>
+            </a:r>
+            <a:endParaRPr lang="tr-TR" altLang="en-US"/>
+          </a:p>
+        </p:txBody>
+      </p:sp>
+      <p:sp>
+        <p:nvSpPr>
+          <p:cNvPr id="4" name="Content Placeholder 3"/>
+          <p:cNvSpPr>
+            <a:spLocks noGrp="1"/>
+          </p:cNvSpPr>
+          <p:nvPr>
+            <p:ph sz="half" idx="2"/>
+          </p:nvPr>
+        </p:nvSpPr>
+        <p:spPr/>
+        <p:txBody>
+          <a:bodyPr/>
+          <a:p>
+            <a:endParaRPr lang="en-US"/>
+          </a:p>
+        </p:txBody>
+      </p:sp>
+      <p:pic>
+        <p:nvPicPr>
+          <p:cNvPr id="5" name="Content Placeholder 4"/>
+          <p:cNvPicPr>
+            <a:picLocks noChangeAspect="1"/>
+          </p:cNvPicPr>
+          <p:nvPr>
+            <p:ph sz="half" idx="1"/>
+          </p:nvPr>
+        </p:nvPicPr>
+        <p:blipFill>
+          <a:blip r:embed="rId1"/>
+          <a:stretch>
+            <a:fillRect/>
+          </a:stretch>
+        </p:blipFill>
+        <p:spPr>
+          <a:xfrm>
+            <a:off x="1141730" y="2097405"/>
+            <a:ext cx="4594860" cy="1501775"/>
+          </a:xfrm>
+          <a:prstGeom prst="rect">
+            <a:avLst/>
+          </a:prstGeom>
+        </p:spPr>
+      </p:pic>
+    </p:spTree>
+  </p:cSld>
+  <p:clrMapOvr>
+    <a:masterClrMapping/>
+  </p:clrMapOvr>
+</p:sld>
+</file>
+
+<file path=ppt/slides/slide86.xml><?xml version="1.0" encoding="utf-8"?>
+<p:sld xmlns:a="http://schemas.openxmlformats.org/drawingml/2006/main" xmlns:r="http://schemas.openxmlformats.org/officeDocument/2006/relationships" xmlns:p="http://schemas.openxmlformats.org/presentationml/2006/main">
+  <p:cSld>
+    <p:spTree>
+      <p:nvGrpSpPr>
+        <p:cNvPr id="1" name=""/>
+        <p:cNvGrpSpPr/>
+        <p:nvPr/>
+      </p:nvGrpSpPr>
+      <p:grpSpPr/>
+      <p:sp>
+        <p:nvSpPr>
+          <p:cNvPr id="2" name="Title 1"/>
+          <p:cNvSpPr>
+            <a:spLocks noGrp="1"/>
+          </p:cNvSpPr>
+          <p:nvPr>
+            <p:ph type="title"/>
+          </p:nvPr>
+        </p:nvSpPr>
+        <p:spPr/>
+        <p:txBody>
+          <a:bodyPr/>
+          <a:p>
+            <a:r>
+              <a:rPr lang="tr-TR" altLang="en-US"/>
+              <a:t>Sorular</a:t>
+            </a:r>
+            <a:endParaRPr lang="tr-TR" altLang="en-US"/>
+          </a:p>
+        </p:txBody>
+      </p:sp>
+      <p:sp>
+        <p:nvSpPr>
+          <p:cNvPr id="3" name="Content Placeholder 2"/>
+          <p:cNvSpPr>
+            <a:spLocks noGrp="1"/>
+          </p:cNvSpPr>
+          <p:nvPr>
+            <p:ph sz="half" idx="1"/>
+          </p:nvPr>
+        </p:nvSpPr>
+        <p:spPr>
+          <a:xfrm>
+            <a:off x="1141095" y="2249170"/>
+            <a:ext cx="4878705" cy="4019550"/>
+          </a:xfrm>
+        </p:spPr>
+        <p:txBody>
+          <a:bodyPr>
+            <a:normAutofit lnSpcReduction="10000"/>
+          </a:bodyPr>
+          <a:p>
+            <a:r>
+              <a:rPr lang="en-US"/>
+              <a:t>Shape</a:t>
+            </a:r>
+            <a:r>
+              <a:rPr lang="tr-TR" altLang="en-US"/>
+              <a:t>, Circle ve Rectangle adında 3 class oluşturunuz. Circle ve Rectangle, Shape class ını extend almalıdır.</a:t>
+            </a:r>
+            <a:endParaRPr lang="tr-TR" altLang="en-US"/>
+          </a:p>
+          <a:p>
+            <a:r>
+              <a:rPr lang="tr-TR" altLang="en-US"/>
+              <a:t>drawShape() methodu olsun ve syso ile yazdırma işlemlerini test edin.</a:t>
+            </a:r>
+            <a:endParaRPr lang="tr-TR" altLang="en-US"/>
+          </a:p>
+          <a:p>
+            <a:r>
+              <a:rPr lang="tr-TR" altLang="en-US"/>
+              <a:t>instanceof keyword ünü kullanın.</a:t>
+            </a:r>
+            <a:endParaRPr lang="tr-TR" altLang="en-US"/>
+          </a:p>
+          <a:p>
+            <a:r>
+              <a:rPr lang="tr-TR" altLang="en-US"/>
+              <a:t>casting işlemi yapın.</a:t>
+            </a:r>
+            <a:endParaRPr lang="tr-TR" altLang="en-US"/>
+          </a:p>
+        </p:txBody>
+      </p:sp>
+      <p:sp>
+        <p:nvSpPr>
+          <p:cNvPr id="4" name="Content Placeholder 3"/>
+          <p:cNvSpPr>
+            <a:spLocks noGrp="1"/>
+          </p:cNvSpPr>
+          <p:nvPr>
+            <p:ph sz="half" idx="2"/>
+          </p:nvPr>
+        </p:nvSpPr>
+        <p:spPr/>
+        <p:txBody>
+          <a:bodyPr/>
+          <a:p>
+            <a:endParaRPr lang="en-US"/>
+          </a:p>
+        </p:txBody>
+      </p:sp>
+    </p:spTree>
+  </p:cSld>
+  <p:clrMapOvr>
+    <a:masterClrMapping/>
+  </p:clrMapOvr>
+</p:sld>
+</file>
+
+<file path=ppt/slides/slide87.xml><?xml version="1.0" encoding="utf-8"?>
+<p:sld xmlns:a="http://schemas.openxmlformats.org/drawingml/2006/main" xmlns:r="http://schemas.openxmlformats.org/officeDocument/2006/relationships" xmlns:p="http://schemas.openxmlformats.org/presentationml/2006/main">
+  <p:cSld>
+    <p:spTree>
+      <p:nvGrpSpPr>
+        <p:cNvPr id="1" name=""/>
+        <p:cNvGrpSpPr/>
+        <p:nvPr/>
+      </p:nvGrpSpPr>
+      <p:grpSpPr/>
+      <p:sp>
+        <p:nvSpPr>
+          <p:cNvPr id="2" name="Title 1"/>
+          <p:cNvSpPr>
+            <a:spLocks noGrp="1"/>
+          </p:cNvSpPr>
+          <p:nvPr>
+            <p:ph type="title"/>
+          </p:nvPr>
+        </p:nvSpPr>
+        <p:spPr/>
+        <p:txBody>
+          <a:bodyPr/>
+          <a:p>
+            <a:r>
+              <a:rPr lang="tr-TR" altLang="en-US"/>
+              <a:t>ENUM CLASS</a:t>
+            </a:r>
+            <a:endParaRPr lang="tr-TR" altLang="en-US"/>
+          </a:p>
+        </p:txBody>
+      </p:sp>
+      <p:sp>
+        <p:nvSpPr>
+          <p:cNvPr id="3" name="Content Placeholder 2"/>
+          <p:cNvSpPr>
+            <a:spLocks noGrp="1"/>
+          </p:cNvSpPr>
+          <p:nvPr>
+            <p:ph sz="half" idx="1"/>
+          </p:nvPr>
+        </p:nvSpPr>
+        <p:spPr/>
+        <p:txBody>
+          <a:bodyPr/>
+          <a:p>
+            <a:r>
+              <a:rPr lang="en-US"/>
+              <a:t>Java'da enum türleri özel bir sınıf türü olarak kabul edilir. Java 5'in piyasaya sürülmesiyle tanıtıldı.</a:t>
+            </a:r>
+            <a:endParaRPr lang="en-US"/>
+          </a:p>
+          <a:p>
+            <a:endParaRPr lang="en-US"/>
+          </a:p>
+          <a:p>
+            <a:r>
+              <a:rPr lang="en-US"/>
+              <a:t>Bir enum sınıfı, normal sınıflar gibi yöntemler ve alanlar içerebilir.</a:t>
+            </a:r>
+            <a:endParaRPr lang="en-US"/>
+          </a:p>
+        </p:txBody>
+      </p:sp>
+      <p:sp>
+        <p:nvSpPr>
+          <p:cNvPr id="4" name="Content Placeholder 3"/>
+          <p:cNvSpPr>
+            <a:spLocks noGrp="1"/>
+          </p:cNvSpPr>
+          <p:nvPr>
+            <p:ph sz="half" idx="2"/>
+          </p:nvPr>
+        </p:nvSpPr>
+        <p:spPr/>
+        <p:txBody>
+          <a:bodyPr/>
+          <a:p>
+            <a:r>
+              <a:rPr lang="en-US"/>
+              <a:t>Bir enum sınıfı oluşturduğumuzda, derleyici her enum sabitinin örneklerini (nesnelerini) oluşturacaktır.</a:t>
+            </a:r>
+            <a:endParaRPr lang="en-US"/>
+          </a:p>
+          <a:p>
+            <a:r>
+              <a:rPr lang="en-US"/>
+              <a:t>new ile enum türünde bir nesne oluşturmaya çalışmak bir derleme hatasıdır</a:t>
+            </a:r>
+            <a:endParaRPr lang="en-US"/>
+          </a:p>
+        </p:txBody>
+      </p:sp>
+    </p:spTree>
+  </p:cSld>
+  <p:clrMapOvr>
+    <a:masterClrMapping/>
+  </p:clrMapOvr>
+</p:sld>
+</file>
+
+<file path=ppt/slides/slide88.xml><?xml version="1.0" encoding="utf-8"?>
+<p:sld xmlns:a="http://schemas.openxmlformats.org/drawingml/2006/main" xmlns:r="http://schemas.openxmlformats.org/officeDocument/2006/relationships" xmlns:p="http://schemas.openxmlformats.org/presentationml/2006/main">
+  <p:cSld>
+    <p:spTree>
+      <p:nvGrpSpPr>
+        <p:cNvPr id="1" name=""/>
+        <p:cNvGrpSpPr/>
+        <p:nvPr/>
+      </p:nvGrpSpPr>
+      <p:grpSpPr/>
+      <p:sp>
+        <p:nvSpPr>
+          <p:cNvPr id="3" name="Content Placeholder 2"/>
+          <p:cNvSpPr>
+            <a:spLocks noGrp="1"/>
+          </p:cNvSpPr>
+          <p:nvPr>
+            <p:ph sz="half" idx="1"/>
+          </p:nvPr>
+        </p:nvSpPr>
+        <p:spPr>
+          <a:xfrm>
+            <a:off x="1141095" y="311150"/>
+            <a:ext cx="4878705" cy="6365875"/>
+          </a:xfrm>
+        </p:spPr>
+        <p:txBody>
+          <a:bodyPr>
+            <a:normAutofit lnSpcReduction="10000"/>
+          </a:bodyPr>
+          <a:p>
+            <a:r>
+              <a:rPr lang="en-US"/>
+              <a:t>enum declaration</a:t>
+            </a:r>
+            <a:r>
+              <a:rPr lang="tr-TR" altLang="en-US"/>
+              <a:t> :</a:t>
+            </a:r>
+            <a:endParaRPr lang="tr-TR" altLang="en-US"/>
+          </a:p>
+          <a:p>
+            <a:pPr marL="0" indent="0">
+              <a:buNone/>
+            </a:pPr>
+            <a:r>
+              <a:rPr lang="tr-TR" altLang="en-US"/>
+              <a:t>1-Enum sabitlerinin virgülle ayrılmış listesi</a:t>
+            </a:r>
+            <a:endParaRPr lang="tr-TR" altLang="en-US"/>
+          </a:p>
+          <a:p>
+            <a:pPr marL="0" indent="0">
+              <a:buNone/>
+            </a:pPr>
+            <a:r>
+              <a:rPr lang="tr-TR" altLang="en-US"/>
+              <a:t>2-Aşağıdaki kısıtlamalara sahip bir enum sınıfı bildirir:</a:t>
+            </a:r>
+            <a:endParaRPr lang="tr-TR" altLang="en-US"/>
+          </a:p>
+          <a:p>
+            <a:pPr marL="0" indent="0">
+              <a:buNone/>
+            </a:pPr>
+            <a:r>
+              <a:rPr lang="tr-TR" altLang="en-US"/>
+              <a:t>enum types are implicitly final</a:t>
+            </a:r>
+            <a:endParaRPr lang="tr-TR" altLang="en-US"/>
+          </a:p>
+          <a:p>
+            <a:pPr marL="0" indent="0">
+              <a:buNone/>
+            </a:pPr>
+            <a:r>
+              <a:rPr lang="tr-TR" altLang="en-US"/>
+              <a:t>enum constants are implicitly static</a:t>
+            </a:r>
+            <a:endParaRPr lang="tr-TR" altLang="en-US"/>
+          </a:p>
+          <a:p>
+            <a:r>
+              <a:rPr lang="tr-TR" altLang="en-US"/>
+              <a:t>enum sabitleri, sabitlerin olabileceği her yerde kullanılabilir</a:t>
+            </a:r>
+            <a:endParaRPr lang="tr-TR" altLang="en-US"/>
+          </a:p>
+          <a:p>
+            <a:r>
+              <a:rPr lang="tr-TR" altLang="en-US"/>
+              <a:t>Sınıf kurucuları gibi, parametreleri belirleyebilir ve aşırı yüklenebilir</a:t>
+            </a:r>
+            <a:endParaRPr lang="tr-TR" altLang="en-US"/>
+          </a:p>
+        </p:txBody>
+      </p:sp>
+      <p:sp>
+        <p:nvSpPr>
+          <p:cNvPr id="4" name="Content Placeholder 3"/>
+          <p:cNvSpPr>
+            <a:spLocks noGrp="1"/>
+          </p:cNvSpPr>
+          <p:nvPr>
+            <p:ph sz="half" idx="2"/>
+          </p:nvPr>
+        </p:nvSpPr>
+        <p:spPr/>
+        <p:txBody>
+          <a:bodyPr/>
+          <a:p>
+            <a:r>
+              <a:rPr lang="en-US"/>
+              <a:t>public enum CoffeSizes{SMALL,MEDIUM,LARGE,GRANDE}</a:t>
+            </a:r>
+            <a:endParaRPr lang="en-US"/>
+          </a:p>
+        </p:txBody>
+      </p:sp>
+    </p:spTree>
+  </p:cSld>
+  <p:clrMapOvr>
+    <a:masterClrMapping/>
+  </p:clrMapOvr>
+</p:sld>
+</file>
+
+<file path=ppt/slides/slide89.xml><?xml version="1.0" encoding="utf-8"?>
+<p:sld xmlns:a="http://schemas.openxmlformats.org/drawingml/2006/main" xmlns:r="http://schemas.openxmlformats.org/officeDocument/2006/relationships" xmlns:p="http://schemas.openxmlformats.org/presentationml/2006/main">
+  <p:cSld>
+    <p:spTree>
+      <p:nvGrpSpPr>
+        <p:cNvPr id="1" name=""/>
+        <p:cNvGrpSpPr/>
+        <p:nvPr/>
+      </p:nvGrpSpPr>
+      <p:grpSpPr/>
+      <p:sp>
+        <p:nvSpPr>
+          <p:cNvPr id="2" name="Title 1"/>
+          <p:cNvSpPr>
+            <a:spLocks noGrp="1"/>
+          </p:cNvSpPr>
+          <p:nvPr>
+            <p:ph type="title"/>
+          </p:nvPr>
+        </p:nvSpPr>
+        <p:spPr/>
+        <p:txBody>
+          <a:bodyPr/>
+          <a:p>
+            <a:endParaRPr lang="en-US"/>
+          </a:p>
+        </p:txBody>
+      </p:sp>
+      <p:sp>
+        <p:nvSpPr>
+          <p:cNvPr id="4" name="Content Placeholder 3"/>
+          <p:cNvSpPr>
+            <a:spLocks noGrp="1"/>
+          </p:cNvSpPr>
+          <p:nvPr>
+            <p:ph sz="half" idx="2"/>
+          </p:nvPr>
+        </p:nvSpPr>
+        <p:spPr/>
+        <p:txBody>
+          <a:bodyPr/>
+          <a:p>
+            <a:endParaRPr lang="en-US"/>
+          </a:p>
+        </p:txBody>
+      </p:sp>
+      <p:pic>
+        <p:nvPicPr>
+          <p:cNvPr id="5" name="Content Placeholder 4"/>
+          <p:cNvPicPr>
+            <a:picLocks noChangeAspect="1"/>
+          </p:cNvPicPr>
+          <p:nvPr>
+            <p:ph sz="half" idx="1"/>
+          </p:nvPr>
+        </p:nvPicPr>
+        <p:blipFill>
+          <a:blip r:embed="rId1"/>
+          <a:stretch>
+            <a:fillRect/>
+          </a:stretch>
+        </p:blipFill>
+        <p:spPr>
+          <a:xfrm>
+            <a:off x="518160" y="238760"/>
+            <a:ext cx="11071860" cy="6363335"/>
+          </a:xfrm>
+          <a:prstGeom prst="rect">
+            <a:avLst/>
+          </a:prstGeom>
+        </p:spPr>
+      </p:pic>
+    </p:spTree>
+  </p:cSld>
+  <p:clrMapOvr>
+    <a:masterClrMapping/>
+  </p:clrMapOvr>
+</p:sld>
+</file>
+
 <file path=ppt/slides/slide9.xml><?xml version="1.0" encoding="utf-8"?>
 <p:sld xmlns:a="http://schemas.openxmlformats.org/drawingml/2006/main" xmlns:r="http://schemas.openxmlformats.org/officeDocument/2006/relationships" xmlns:p="http://schemas.openxmlformats.org/presentationml/2006/main">
   <p:cSld>
@@ -35638,6 +37792,460 @@
             <a:r>
               <a:rPr lang="tr-TR" dirty="0"/>
               <a:t>(“x= ” + x); }</a:t>
+            </a:r>
+            <a:endParaRPr lang="tr-TR" dirty="0"/>
+          </a:p>
+        </p:txBody>
+      </p:sp>
+    </p:spTree>
+  </p:cSld>
+  <p:clrMapOvr>
+    <a:masterClrMapping/>
+  </p:clrMapOvr>
+</p:sld>
+</file>
+
+<file path=ppt/slides/slide90.xml><?xml version="1.0" encoding="utf-8"?>
+<p:sld xmlns:a="http://schemas.openxmlformats.org/drawingml/2006/main" xmlns:r="http://schemas.openxmlformats.org/officeDocument/2006/relationships" xmlns:p="http://schemas.openxmlformats.org/presentationml/2006/main">
+  <p:cSld>
+    <p:spTree>
+      <p:nvGrpSpPr>
+        <p:cNvPr id="1" name=""/>
+        <p:cNvGrpSpPr/>
+        <p:nvPr/>
+      </p:nvGrpSpPr>
+      <p:grpSpPr/>
+      <p:sp>
+        <p:nvSpPr>
+          <p:cNvPr id="3" name="Content Placeholder 2"/>
+          <p:cNvSpPr>
+            <a:spLocks noGrp="1"/>
+          </p:cNvSpPr>
+          <p:nvPr>
+            <p:ph sz="half" idx="1"/>
+          </p:nvPr>
+        </p:nvSpPr>
+        <p:spPr>
+          <a:xfrm>
+            <a:off x="1141095" y="428625"/>
+            <a:ext cx="4878705" cy="6219190"/>
+          </a:xfrm>
+        </p:spPr>
+        <p:txBody>
+          <a:bodyPr>
+            <a:normAutofit fontScale="25000"/>
+          </a:bodyPr>
+          <a:p>
+            <a:r>
+              <a:rPr lang="en-US"/>
+              <a:t>enum Size{</a:t>
+            </a:r>
+            <a:endParaRPr lang="en-US"/>
+          </a:p>
+          <a:p>
+            <a:r>
+              <a:rPr lang="en-US"/>
+              <a:t>  SMALL, MEDIUM, LARGE, EXTRALARGE;</a:t>
+            </a:r>
+            <a:endParaRPr lang="en-US"/>
+          </a:p>
+          <a:p>
+            <a:r>
+              <a:rPr lang="en-US"/>
+              <a:t>  public String getSize() {</a:t>
+            </a:r>
+            <a:endParaRPr lang="en-US"/>
+          </a:p>
+          <a:p>
+            <a:r>
+              <a:rPr lang="en-US"/>
+              <a:t>    // this will refer to the object SMALL</a:t>
+            </a:r>
+            <a:endParaRPr lang="en-US"/>
+          </a:p>
+          <a:p>
+            <a:r>
+              <a:rPr lang="en-US"/>
+              <a:t>    switch(this) {</a:t>
+            </a:r>
+            <a:endParaRPr lang="en-US"/>
+          </a:p>
+          <a:p>
+            <a:r>
+              <a:rPr lang="en-US"/>
+              <a:t>      case SMALL:</a:t>
+            </a:r>
+            <a:endParaRPr lang="en-US"/>
+          </a:p>
+          <a:p>
+            <a:r>
+              <a:rPr lang="en-US"/>
+              <a:t>        return "small";</a:t>
+            </a:r>
+            <a:endParaRPr lang="en-US"/>
+          </a:p>
+          <a:p>
+            <a:r>
+              <a:rPr lang="en-US"/>
+              <a:t>      case MEDIUM:</a:t>
+            </a:r>
+            <a:endParaRPr lang="en-US"/>
+          </a:p>
+          <a:p>
+            <a:r>
+              <a:rPr lang="en-US"/>
+              <a:t>        return "medium";</a:t>
+            </a:r>
+            <a:endParaRPr lang="en-US"/>
+          </a:p>
+          <a:p>
+            <a:r>
+              <a:rPr lang="en-US"/>
+              <a:t>      case LARGE:</a:t>
+            </a:r>
+            <a:endParaRPr lang="en-US"/>
+          </a:p>
+          <a:p>
+            <a:r>
+              <a:rPr lang="en-US"/>
+              <a:t>        return "large";</a:t>
+            </a:r>
+            <a:endParaRPr lang="en-US"/>
+          </a:p>
+          <a:p>
+            <a:r>
+              <a:rPr lang="en-US"/>
+              <a:t>      case EXTRALARGE:</a:t>
+            </a:r>
+            <a:endParaRPr lang="en-US"/>
+          </a:p>
+          <a:p>
+            <a:r>
+              <a:rPr lang="en-US"/>
+              <a:t>        return "extra large";</a:t>
+            </a:r>
+            <a:endParaRPr lang="en-US"/>
+          </a:p>
+          <a:p>
+            <a:r>
+              <a:rPr lang="en-US"/>
+              <a:t>      default:</a:t>
+            </a:r>
+            <a:endParaRPr lang="en-US"/>
+          </a:p>
+          <a:p>
+            <a:r>
+              <a:rPr lang="en-US"/>
+              <a:t>        return null;</a:t>
+            </a:r>
+            <a:endParaRPr lang="en-US"/>
+          </a:p>
+          <a:p>
+            <a:r>
+              <a:rPr lang="en-US"/>
+              <a:t>      }</a:t>
+            </a:r>
+            <a:endParaRPr lang="en-US"/>
+          </a:p>
+          <a:p>
+            <a:r>
+              <a:rPr lang="en-US"/>
+              <a:t>   }</a:t>
+            </a:r>
+            <a:endParaRPr lang="en-US"/>
+          </a:p>
+          <a:p>
+            <a:r>
+              <a:rPr lang="en-US"/>
+              <a:t>  public static void main(String[] args) {</a:t>
+            </a:r>
+            <a:endParaRPr lang="en-US"/>
+          </a:p>
+          <a:p>
+            <a:r>
+              <a:rPr lang="en-US"/>
+              <a:t>    // call getSize()</a:t>
+            </a:r>
+            <a:endParaRPr lang="en-US"/>
+          </a:p>
+          <a:p>
+            <a:r>
+              <a:rPr lang="en-US"/>
+              <a:t>    // using the object SMALL</a:t>
+            </a:r>
+            <a:endParaRPr lang="en-US"/>
+          </a:p>
+          <a:p>
+            <a:r>
+              <a:rPr lang="en-US"/>
+              <a:t>    System.out.println("The size of the pizza is " + Size.SMALL.getSize());</a:t>
+            </a:r>
+            <a:endParaRPr lang="en-US"/>
+          </a:p>
+          <a:p>
+            <a:r>
+              <a:rPr lang="en-US"/>
+              <a:t>  }</a:t>
+            </a:r>
+            <a:endParaRPr lang="en-US"/>
+          </a:p>
+          <a:p>
+            <a:r>
+              <a:rPr lang="en-US"/>
+              <a:t>}</a:t>
+            </a:r>
+            <a:endParaRPr lang="en-US"/>
+          </a:p>
+        </p:txBody>
+      </p:sp>
+      <p:sp>
+        <p:nvSpPr>
+          <p:cNvPr id="4" name="Content Placeholder 3"/>
+          <p:cNvSpPr>
+            <a:spLocks noGrp="1"/>
+          </p:cNvSpPr>
+          <p:nvPr>
+            <p:ph sz="half" idx="2"/>
+          </p:nvPr>
+        </p:nvSpPr>
+        <p:spPr/>
+        <p:txBody>
+          <a:bodyPr/>
+          <a:p>
+            <a:endParaRPr lang="en-US"/>
+          </a:p>
+        </p:txBody>
+      </p:sp>
+    </p:spTree>
+  </p:cSld>
+  <p:clrMapOvr>
+    <a:masterClrMapping/>
+  </p:clrMapOvr>
+</p:sld>
+</file>
+
+<file path=ppt/slides/slide91.xml><?xml version="1.0" encoding="utf-8"?>
+<p:sld xmlns:a="http://schemas.openxmlformats.org/drawingml/2006/main" xmlns:r="http://schemas.openxmlformats.org/officeDocument/2006/relationships" xmlns:p="http://schemas.openxmlformats.org/presentationml/2006/main">
+  <p:cSld>
+    <p:spTree>
+      <p:nvGrpSpPr>
+        <p:cNvPr id="1" name=""/>
+        <p:cNvGrpSpPr/>
+        <p:nvPr/>
+      </p:nvGrpSpPr>
+      <p:grpSpPr/>
+      <p:sp>
+        <p:nvSpPr>
+          <p:cNvPr id="2" name="Title 1"/>
+          <p:cNvSpPr>
+            <a:spLocks noGrp="1"/>
+          </p:cNvSpPr>
+          <p:nvPr>
+            <p:ph type="title"/>
+          </p:nvPr>
+        </p:nvSpPr>
+        <p:spPr/>
+        <p:txBody>
+          <a:bodyPr/>
+          <a:p>
+            <a:endParaRPr lang="en-US"/>
+          </a:p>
+        </p:txBody>
+      </p:sp>
+      <p:pic>
+        <p:nvPicPr>
+          <p:cNvPr id="5" name="Content Placeholder 4"/>
+          <p:cNvPicPr>
+            <a:picLocks noChangeAspect="1"/>
+          </p:cNvPicPr>
+          <p:nvPr>
+            <p:ph sz="half" idx="1"/>
+          </p:nvPr>
+        </p:nvPicPr>
+        <p:blipFill>
+          <a:blip r:embed="rId1"/>
+          <a:stretch>
+            <a:fillRect/>
+          </a:stretch>
+        </p:blipFill>
+        <p:spPr>
+          <a:xfrm>
+            <a:off x="1022350" y="1809115"/>
+            <a:ext cx="4629150" cy="3476625"/>
+          </a:xfrm>
+          <a:prstGeom prst="rect">
+            <a:avLst/>
+          </a:prstGeom>
+        </p:spPr>
+      </p:pic>
+      <p:pic>
+        <p:nvPicPr>
+          <p:cNvPr id="6" name="Content Placeholder 5"/>
+          <p:cNvPicPr>
+            <a:picLocks noChangeAspect="1"/>
+          </p:cNvPicPr>
+          <p:nvPr>
+            <p:ph sz="half" idx="2"/>
+          </p:nvPr>
+        </p:nvPicPr>
+        <p:blipFill>
+          <a:blip r:embed="rId2"/>
+          <a:stretch>
+            <a:fillRect/>
+          </a:stretch>
+        </p:blipFill>
+        <p:spPr>
+          <a:xfrm>
+            <a:off x="6619875" y="2797175"/>
+            <a:ext cx="4874895" cy="1930400"/>
+          </a:xfrm>
+          <a:prstGeom prst="rect">
+            <a:avLst/>
+          </a:prstGeom>
+        </p:spPr>
+      </p:pic>
+    </p:spTree>
+  </p:cSld>
+  <p:clrMapOvr>
+    <a:masterClrMapping/>
+  </p:clrMapOvr>
+</p:sld>
+</file>
+
+<file path=ppt/slides/slide92.xml><?xml version="1.0" encoding="utf-8"?>
+<p:sld xmlns:a="http://schemas.openxmlformats.org/drawingml/2006/main" xmlns:r="http://schemas.openxmlformats.org/officeDocument/2006/relationships" xmlns:p="http://schemas.openxmlformats.org/presentationml/2006/main">
+  <p:cSld>
+    <p:spTree>
+      <p:nvGrpSpPr>
+        <p:cNvPr id="1" name=""/>
+        <p:cNvGrpSpPr/>
+        <p:nvPr/>
+      </p:nvGrpSpPr>
+      <p:grpSpPr/>
+      <p:sp>
+        <p:nvSpPr>
+          <p:cNvPr id="2" name="Title 1"/>
+          <p:cNvSpPr>
+            <a:spLocks noGrp="1"/>
+          </p:cNvSpPr>
+          <p:nvPr>
+            <p:ph type="title"/>
+          </p:nvPr>
+        </p:nvSpPr>
+        <p:spPr/>
+        <p:txBody>
+          <a:bodyPr/>
+          <a:p>
+            <a:endParaRPr lang="en-US"/>
+          </a:p>
+        </p:txBody>
+      </p:sp>
+      <p:sp>
+        <p:nvSpPr>
+          <p:cNvPr id="4" name="Content Placeholder 3"/>
+          <p:cNvSpPr>
+            <a:spLocks noGrp="1"/>
+          </p:cNvSpPr>
+          <p:nvPr>
+            <p:ph sz="half" idx="2"/>
+          </p:nvPr>
+        </p:nvSpPr>
+        <p:spPr/>
+        <p:txBody>
+          <a:bodyPr/>
+          <a:p>
+            <a:endParaRPr lang="en-US"/>
+          </a:p>
+        </p:txBody>
+      </p:sp>
+      <p:pic>
+        <p:nvPicPr>
+          <p:cNvPr id="5" name="Content Placeholder 4"/>
+          <p:cNvPicPr>
+            <a:picLocks noChangeAspect="1"/>
+          </p:cNvPicPr>
+          <p:nvPr>
+            <p:ph sz="half" idx="1"/>
+          </p:nvPr>
+        </p:nvPicPr>
+        <p:blipFill>
+          <a:blip r:embed="rId1"/>
+          <a:stretch>
+            <a:fillRect/>
+          </a:stretch>
+        </p:blipFill>
+        <p:spPr>
+          <a:xfrm>
+            <a:off x="1141095" y="453390"/>
+            <a:ext cx="10302875" cy="5477510"/>
+          </a:xfrm>
+          <a:prstGeom prst="rect">
+            <a:avLst/>
+          </a:prstGeom>
+        </p:spPr>
+      </p:pic>
+    </p:spTree>
+  </p:cSld>
+  <p:clrMapOvr>
+    <a:masterClrMapping/>
+  </p:clrMapOvr>
+</p:sld>
+</file>
+
+<file path=ppt/slides/slide93.xml><?xml version="1.0" encoding="utf-8"?>
+<p:sld xmlns:a="http://schemas.openxmlformats.org/drawingml/2006/main" xmlns:r="http://schemas.openxmlformats.org/officeDocument/2006/relationships" xmlns:p="http://schemas.openxmlformats.org/presentationml/2006/main">
+  <p:cSld>
+    <p:spTree>
+      <p:nvGrpSpPr>
+        <p:cNvPr id="1" name=""/>
+        <p:cNvGrpSpPr/>
+        <p:nvPr/>
+      </p:nvGrpSpPr>
+      <p:grpSpPr>
+        <a:xfrm>
+          <a:off x="0" y="0"/>
+          <a:ext cx="0" cy="0"/>
+          <a:chOff x="0" y="0"/>
+          <a:chExt cx="0" cy="0"/>
+        </a:xfrm>
+      </p:grpSpPr>
+      <p:sp>
+        <p:nvSpPr>
+          <p:cNvPr id="2" name="Başlık 1"/>
+          <p:cNvSpPr>
+            <a:spLocks noGrp="1"/>
+          </p:cNvSpPr>
+          <p:nvPr>
+            <p:ph type="title"/>
+          </p:nvPr>
+        </p:nvSpPr>
+        <p:spPr/>
+        <p:txBody>
+          <a:bodyPr/>
+          <a:lstStyle/>
+          <a:p>
+            <a:endParaRPr lang="tr-TR"/>
+          </a:p>
+        </p:txBody>
+      </p:sp>
+      <p:sp>
+        <p:nvSpPr>
+          <p:cNvPr id="3" name="İçerik Yer Tutucusu 2"/>
+          <p:cNvSpPr>
+            <a:spLocks noGrp="1"/>
+          </p:cNvSpPr>
+          <p:nvPr>
+            <p:ph idx="1"/>
+          </p:nvPr>
+        </p:nvSpPr>
+        <p:spPr/>
+        <p:txBody>
+          <a:bodyPr/>
+          <a:lstStyle/>
+          <a:p>
+            <a:r>
+              <a:rPr lang="tr-TR" dirty="0"/>
+              <a:t>Dinlediğiniz için teşekkürler</a:t>
             </a:r>
             <a:endParaRPr lang="tr-TR" dirty="0"/>
           </a:p>

</xml_diff>